<commit_message>
Update gitbook 2023-02-02 20:02:54
</commit_message>
<xml_diff>
--- a/DiscordBot/ChatBotIntro.pptx
+++ b/DiscordBot/ChatBotIntro.pptx
@@ -5,16 +5,15 @@
     <p:sldMasterId id="2147483648" r:id="rId1"/>
   </p:sldMasterIdLst>
   <p:notesMasterIdLst>
-    <p:notesMasterId r:id="rId9"/>
+    <p:notesMasterId r:id="rId8"/>
   </p:notesMasterIdLst>
   <p:sldIdLst>
     <p:sldId id="278" r:id="rId2"/>
-    <p:sldId id="281" r:id="rId3"/>
-    <p:sldId id="280" r:id="rId4"/>
-    <p:sldId id="282" r:id="rId5"/>
-    <p:sldId id="283" r:id="rId6"/>
-    <p:sldId id="284" r:id="rId7"/>
-    <p:sldId id="279" r:id="rId8"/>
+    <p:sldId id="284" r:id="rId3"/>
+    <p:sldId id="281" r:id="rId4"/>
+    <p:sldId id="280" r:id="rId5"/>
+    <p:sldId id="282" r:id="rId6"/>
+    <p:sldId id="279" r:id="rId7"/>
   </p:sldIdLst>
   <p:sldSz cx="12192000" cy="6858000"/>
   <p:notesSz cx="6858000" cy="9144000"/>
@@ -214,7 +213,7 @@
           <a:p>
             <a:fld id="{19104133-B5B0-4351-8158-4F0E5EB1E2BF}" type="datetimeFigureOut">
               <a:rPr lang="en-US" smtClean="0"/>
-              <a:t>1/22/2021</a:t>
+              <a:t>1/31/2023</a:t>
             </a:fld>
             <a:endParaRPr lang="en-US"/>
           </a:p>
@@ -525,7 +524,142 @@
           <a:bodyPr/>
           <a:lstStyle/>
           <a:p>
+            <a:pPr marL="171450" indent="-171450">
+              <a:buFont typeface="Arial" panose="020B0604020202020204" pitchFamily="34" charset="0"/>
+              <a:buChar char="•"/>
+            </a:pPr>
+            <a:r>
+              <a:rPr lang="en-US" dirty="0"/>
+              <a:t>Has anyone heard of a chat bot before? Any examples?</a:t>
+            </a:r>
+          </a:p>
+          <a:p>
+            <a:pPr marL="171450" indent="-171450">
+              <a:buFont typeface="Arial" panose="020B0604020202020204" pitchFamily="34" charset="0"/>
+              <a:buChar char="•"/>
+            </a:pPr>
+            <a:r>
+              <a:rPr lang="en-US" dirty="0"/>
+              <a:t>Maybe you’ve heard of </a:t>
+            </a:r>
+            <a:r>
+              <a:rPr lang="en-US" dirty="0" err="1"/>
+              <a:t>ChatGPT</a:t>
+            </a:r>
+            <a:r>
+              <a:rPr lang="en-US" dirty="0"/>
+              <a:t>, from OpenAI… but a chatbot isn’t always quite that sophisticated.</a:t>
+            </a:r>
+          </a:p>
+          <a:p>
+            <a:pPr marL="628650" lvl="1" indent="-171450">
+              <a:buFont typeface="Arial" panose="020B0604020202020204" pitchFamily="34" charset="0"/>
+              <a:buChar char="•"/>
+            </a:pPr>
+            <a:r>
+              <a:rPr lang="en-US" dirty="0"/>
+              <a:t>Do a quick demo of </a:t>
+            </a:r>
+            <a:r>
+              <a:rPr lang="en-US" dirty="0" err="1"/>
+              <a:t>ChatGPT</a:t>
+            </a:r>
+            <a:r>
+              <a:rPr lang="en-US" dirty="0"/>
+              <a:t> if it’s up </a:t>
+            </a:r>
+            <a:r>
+              <a:rPr lang="en-US"/>
+              <a:t>and running</a:t>
+            </a:r>
             <a:endParaRPr lang="en-US" dirty="0"/>
+          </a:p>
+        </p:txBody>
+      </p:sp>
+      <p:sp>
+        <p:nvSpPr>
+          <p:cNvPr id="4" name="Slide Number Placeholder 3"/>
+          <p:cNvSpPr>
+            <a:spLocks noGrp="1"/>
+          </p:cNvSpPr>
+          <p:nvPr>
+            <p:ph type="sldNum" sz="quarter" idx="5"/>
+          </p:nvPr>
+        </p:nvSpPr>
+        <p:spPr/>
+        <p:txBody>
+          <a:bodyPr/>
+          <a:lstStyle/>
+          <a:p>
+            <a:fld id="{DEC8F7F9-57EC-49CF-9FCD-2B781E4B449F}" type="slidenum">
+              <a:rPr lang="en-US" smtClean="0"/>
+              <a:t>2</a:t>
+            </a:fld>
+            <a:endParaRPr lang="en-US"/>
+          </a:p>
+        </p:txBody>
+      </p:sp>
+    </p:spTree>
+    <p:extLst>
+      <p:ext uri="{BB962C8B-B14F-4D97-AF65-F5344CB8AC3E}">
+        <p14:creationId xmlns:p14="http://schemas.microsoft.com/office/powerpoint/2010/main" val="2124401566"/>
+      </p:ext>
+    </p:extLst>
+  </p:cSld>
+  <p:clrMapOvr>
+    <a:masterClrMapping/>
+  </p:clrMapOvr>
+</p:notes>
+</file>
+
+<file path=ppt/notesSlides/notesSlide2.xml><?xml version="1.0" encoding="utf-8"?>
+<p:notes xmlns:a="http://schemas.openxmlformats.org/drawingml/2006/main" xmlns:r="http://schemas.openxmlformats.org/officeDocument/2006/relationships" xmlns:p="http://schemas.openxmlformats.org/presentationml/2006/main">
+  <p:cSld>
+    <p:spTree>
+      <p:nvGrpSpPr>
+        <p:cNvPr id="1" name=""/>
+        <p:cNvGrpSpPr/>
+        <p:nvPr/>
+      </p:nvGrpSpPr>
+      <p:grpSpPr>
+        <a:xfrm>
+          <a:off x="0" y="0"/>
+          <a:ext cx="0" cy="0"/>
+          <a:chOff x="0" y="0"/>
+          <a:chExt cx="0" cy="0"/>
+        </a:xfrm>
+      </p:grpSpPr>
+      <p:sp>
+        <p:nvSpPr>
+          <p:cNvPr id="2" name="Slide Image Placeholder 1"/>
+          <p:cNvSpPr>
+            <a:spLocks noGrp="1" noRot="1" noChangeAspect="1"/>
+          </p:cNvSpPr>
+          <p:nvPr>
+            <p:ph type="sldImg"/>
+          </p:nvPr>
+        </p:nvSpPr>
+        <p:spPr/>
+      </p:sp>
+      <p:sp>
+        <p:nvSpPr>
+          <p:cNvPr id="3" name="Notes Placeholder 2"/>
+          <p:cNvSpPr>
+            <a:spLocks noGrp="1"/>
+          </p:cNvSpPr>
+          <p:nvPr>
+            <p:ph type="body" idx="1"/>
+          </p:nvPr>
+        </p:nvSpPr>
+        <p:spPr/>
+        <p:txBody>
+          <a:bodyPr/>
+          <a:lstStyle/>
+          <a:p>
+            <a:r>
+              <a:rPr lang="en-US" dirty="0"/>
+              <a:t>Let’s get into what a chatbot is.</a:t>
+            </a:r>
           </a:p>
         </p:txBody>
       </p:sp>
@@ -555,7 +689,274 @@
     </p:spTree>
     <p:extLst>
       <p:ext uri="{BB962C8B-B14F-4D97-AF65-F5344CB8AC3E}">
+        <p14:creationId xmlns:p14="http://schemas.microsoft.com/office/powerpoint/2010/main" val="1291287540"/>
+      </p:ext>
+    </p:extLst>
+  </p:cSld>
+  <p:clrMapOvr>
+    <a:masterClrMapping/>
+  </p:clrMapOvr>
+</p:notes>
+</file>
+
+<file path=ppt/notesSlides/notesSlide3.xml><?xml version="1.0" encoding="utf-8"?>
+<p:notes xmlns:a="http://schemas.openxmlformats.org/drawingml/2006/main" xmlns:r="http://schemas.openxmlformats.org/officeDocument/2006/relationships" xmlns:p="http://schemas.openxmlformats.org/presentationml/2006/main">
+  <p:cSld>
+    <p:spTree>
+      <p:nvGrpSpPr>
+        <p:cNvPr id="1" name=""/>
+        <p:cNvGrpSpPr/>
+        <p:nvPr/>
+      </p:nvGrpSpPr>
+      <p:grpSpPr>
+        <a:xfrm>
+          <a:off x="0" y="0"/>
+          <a:ext cx="0" cy="0"/>
+          <a:chOff x="0" y="0"/>
+          <a:chExt cx="0" cy="0"/>
+        </a:xfrm>
+      </p:grpSpPr>
+      <p:sp>
+        <p:nvSpPr>
+          <p:cNvPr id="2" name="Slide Image Placeholder 1"/>
+          <p:cNvSpPr>
+            <a:spLocks noGrp="1" noRot="1" noChangeAspect="1"/>
+          </p:cNvSpPr>
+          <p:nvPr>
+            <p:ph type="sldImg"/>
+          </p:nvPr>
+        </p:nvSpPr>
+        <p:spPr/>
+      </p:sp>
+      <p:sp>
+        <p:nvSpPr>
+          <p:cNvPr id="3" name="Notes Placeholder 2"/>
+          <p:cNvSpPr>
+            <a:spLocks noGrp="1"/>
+          </p:cNvSpPr>
+          <p:nvPr>
+            <p:ph type="body" idx="1"/>
+          </p:nvPr>
+        </p:nvSpPr>
+        <p:spPr/>
+        <p:txBody>
+          <a:bodyPr/>
+          <a:lstStyle/>
+          <a:p>
+            <a:pPr marL="171450" indent="-171450">
+              <a:buFont typeface="Arial" panose="020B0604020202020204" pitchFamily="34" charset="0"/>
+              <a:buChar char="•"/>
+            </a:pPr>
+            <a:r>
+              <a:rPr lang="en-US" dirty="0"/>
+              <a:t>Taking a step back</a:t>
+            </a:r>
+          </a:p>
+          <a:p>
+            <a:pPr marL="171450" indent="-171450">
+              <a:buFont typeface="Arial" panose="020B0604020202020204" pitchFamily="34" charset="0"/>
+              <a:buChar char="•"/>
+            </a:pPr>
+            <a:r>
+              <a:rPr lang="en-US" dirty="0"/>
+              <a:t>one of the first chatbots ever was ELIZA</a:t>
+            </a:r>
+          </a:p>
+          <a:p>
+            <a:pPr marL="171450" indent="-171450">
+              <a:buFont typeface="Arial" panose="020B0604020202020204" pitchFamily="34" charset="0"/>
+              <a:buChar char="•"/>
+            </a:pPr>
+            <a:r>
+              <a:rPr lang="en-US" dirty="0"/>
+              <a:t>It was all the way back in the 60s</a:t>
+            </a:r>
+          </a:p>
+          <a:p>
+            <a:pPr marL="171450" indent="-171450">
+              <a:buFont typeface="Arial" panose="020B0604020202020204" pitchFamily="34" charset="0"/>
+              <a:buChar char="•"/>
+            </a:pPr>
+            <a:r>
+              <a:rPr lang="en-US" dirty="0"/>
+              <a:t>And one of these scripts was designed to act like a Rogerian therapist – it could help people with their problems</a:t>
+            </a:r>
+          </a:p>
+        </p:txBody>
+      </p:sp>
+      <p:sp>
+        <p:nvSpPr>
+          <p:cNvPr id="4" name="Slide Number Placeholder 3"/>
+          <p:cNvSpPr>
+            <a:spLocks noGrp="1"/>
+          </p:cNvSpPr>
+          <p:nvPr>
+            <p:ph type="sldNum" sz="quarter" idx="5"/>
+          </p:nvPr>
+        </p:nvSpPr>
+        <p:spPr/>
+        <p:txBody>
+          <a:bodyPr/>
+          <a:lstStyle/>
+          <a:p>
+            <a:fld id="{DEC8F7F9-57EC-49CF-9FCD-2B781E4B449F}" type="slidenum">
+              <a:rPr lang="en-US" smtClean="0"/>
+              <a:t>4</a:t>
+            </a:fld>
+            <a:endParaRPr lang="en-US"/>
+          </a:p>
+        </p:txBody>
+      </p:sp>
+    </p:spTree>
+    <p:extLst>
+      <p:ext uri="{BB962C8B-B14F-4D97-AF65-F5344CB8AC3E}">
         <p14:creationId xmlns:p14="http://schemas.microsoft.com/office/powerpoint/2010/main" val="623912515"/>
+      </p:ext>
+    </p:extLst>
+  </p:cSld>
+  <p:clrMapOvr>
+    <a:masterClrMapping/>
+  </p:clrMapOvr>
+</p:notes>
+</file>
+
+<file path=ppt/notesSlides/notesSlide4.xml><?xml version="1.0" encoding="utf-8"?>
+<p:notes xmlns:a="http://schemas.openxmlformats.org/drawingml/2006/main" xmlns:r="http://schemas.openxmlformats.org/officeDocument/2006/relationships" xmlns:p="http://schemas.openxmlformats.org/presentationml/2006/main">
+  <p:cSld>
+    <p:spTree>
+      <p:nvGrpSpPr>
+        <p:cNvPr id="1" name=""/>
+        <p:cNvGrpSpPr/>
+        <p:nvPr/>
+      </p:nvGrpSpPr>
+      <p:grpSpPr>
+        <a:xfrm>
+          <a:off x="0" y="0"/>
+          <a:ext cx="0" cy="0"/>
+          <a:chOff x="0" y="0"/>
+          <a:chExt cx="0" cy="0"/>
+        </a:xfrm>
+      </p:grpSpPr>
+      <p:sp>
+        <p:nvSpPr>
+          <p:cNvPr id="2" name="Slide Image Placeholder 1"/>
+          <p:cNvSpPr>
+            <a:spLocks noGrp="1" noRot="1" noChangeAspect="1"/>
+          </p:cNvSpPr>
+          <p:nvPr>
+            <p:ph type="sldImg"/>
+          </p:nvPr>
+        </p:nvSpPr>
+        <p:spPr/>
+      </p:sp>
+      <p:sp>
+        <p:nvSpPr>
+          <p:cNvPr id="3" name="Notes Placeholder 2"/>
+          <p:cNvSpPr>
+            <a:spLocks noGrp="1"/>
+          </p:cNvSpPr>
+          <p:nvPr>
+            <p:ph type="body" idx="1"/>
+          </p:nvPr>
+        </p:nvSpPr>
+        <p:spPr/>
+        <p:txBody>
+          <a:bodyPr/>
+          <a:lstStyle/>
+          <a:p>
+            <a:pPr marL="171450" indent="-171450">
+              <a:buFont typeface="Arial" panose="020B0604020202020204" pitchFamily="34" charset="0"/>
+              <a:buChar char="•"/>
+            </a:pPr>
+            <a:r>
+              <a:rPr lang="en-US" dirty="0"/>
+              <a:t>There are a ton of modern uses for chatbots</a:t>
+            </a:r>
+          </a:p>
+          <a:p>
+            <a:pPr marL="171450" indent="-171450">
+              <a:buFont typeface="Arial" panose="020B0604020202020204" pitchFamily="34" charset="0"/>
+              <a:buChar char="•"/>
+            </a:pPr>
+            <a:r>
+              <a:rPr lang="en-US" dirty="0"/>
+              <a:t>You might have some of them on your phone</a:t>
+            </a:r>
+          </a:p>
+          <a:p>
+            <a:pPr marL="171450" indent="-171450">
+              <a:buFont typeface="Arial" panose="020B0604020202020204" pitchFamily="34" charset="0"/>
+              <a:buChar char="•"/>
+            </a:pPr>
+            <a:r>
+              <a:rPr lang="en-US" dirty="0"/>
+              <a:t>Things like online assistants</a:t>
+            </a:r>
+          </a:p>
+          <a:p>
+            <a:pPr marL="171450" indent="-171450">
+              <a:buFont typeface="Arial" panose="020B0604020202020204" pitchFamily="34" charset="0"/>
+              <a:buChar char="•"/>
+            </a:pPr>
+            <a:r>
+              <a:rPr lang="en-US" dirty="0"/>
+              <a:t>Online tech support</a:t>
+            </a:r>
+          </a:p>
+          <a:p>
+            <a:pPr marL="171450" indent="-171450">
+              <a:buFont typeface="Arial" panose="020B0604020202020204" pitchFamily="34" charset="0"/>
+              <a:buChar char="•"/>
+            </a:pPr>
+            <a:r>
+              <a:rPr lang="en-US" dirty="0"/>
+              <a:t>Siri, Alexa, </a:t>
+            </a:r>
+            <a:r>
+              <a:rPr lang="en-US" dirty="0" err="1"/>
+              <a:t>etc</a:t>
+            </a:r>
+            <a:endParaRPr lang="en-US" dirty="0"/>
+          </a:p>
+          <a:p>
+            <a:pPr marL="171450" indent="-171450">
+              <a:buFont typeface="Arial" panose="020B0604020202020204" pitchFamily="34" charset="0"/>
+              <a:buChar char="•"/>
+            </a:pPr>
+            <a:r>
+              <a:rPr lang="en-US" dirty="0"/>
+              <a:t>And Discord has a ton of bots! That’s what we’ll be using for this lesson</a:t>
+            </a:r>
+          </a:p>
+        </p:txBody>
+      </p:sp>
+      <p:sp>
+        <p:nvSpPr>
+          <p:cNvPr id="4" name="Slide Number Placeholder 3"/>
+          <p:cNvSpPr>
+            <a:spLocks noGrp="1"/>
+          </p:cNvSpPr>
+          <p:nvPr>
+            <p:ph type="sldNum" sz="quarter" idx="5"/>
+          </p:nvPr>
+        </p:nvSpPr>
+        <p:spPr/>
+        <p:txBody>
+          <a:bodyPr/>
+          <a:lstStyle/>
+          <a:p>
+            <a:fld id="{DEC8F7F9-57EC-49CF-9FCD-2B781E4B449F}" type="slidenum">
+              <a:rPr lang="en-US" smtClean="0"/>
+              <a:t>5</a:t>
+            </a:fld>
+            <a:endParaRPr lang="en-US"/>
+          </a:p>
+        </p:txBody>
+      </p:sp>
+    </p:spTree>
+    <p:extLst>
+      <p:ext uri="{BB962C8B-B14F-4D97-AF65-F5344CB8AC3E}">
+        <p14:creationId xmlns:p14="http://schemas.microsoft.com/office/powerpoint/2010/main" val="2791291231"/>
       </p:ext>
     </p:extLst>
   </p:cSld>
@@ -749,7 +1150,7 @@
             <a:fld id="{1C2D31DE-C454-491C-B5C3-F097855E3DF7}" type="datetime4">
               <a:rPr lang="en-US" smtClean="0"/>
               <a:pPr/>
-              <a:t>January 22, 2021</a:t>
+              <a:t>January 31, 2023</a:t>
             </a:fld>
             <a:endParaRPr lang="en-US" dirty="0"/>
           </a:p>
@@ -4142,7 +4543,7 @@
           <a:p>
             <a:fld id="{5958763E-B898-436D-883D-03711491D54A}" type="datetimeFigureOut">
               <a:rPr lang="en-US" smtClean="0"/>
-              <a:t>1/22/2021</a:t>
+              <a:t>1/31/2023</a:t>
             </a:fld>
             <a:endParaRPr lang="en-US"/>
           </a:p>
@@ -4337,7 +4738,7 @@
           <a:p>
             <a:fld id="{5958763E-B898-436D-883D-03711491D54A}" type="datetimeFigureOut">
               <a:rPr lang="en-US" smtClean="0"/>
-              <a:t>1/22/2021</a:t>
+              <a:t>1/31/2023</a:t>
             </a:fld>
             <a:endParaRPr lang="en-US"/>
           </a:p>
@@ -4588,7 +4989,7 @@
           <a:p>
             <a:fld id="{5958763E-B898-436D-883D-03711491D54A}" type="datetimeFigureOut">
               <a:rPr lang="en-US" smtClean="0"/>
-              <a:t>1/22/2021</a:t>
+              <a:t>1/31/2023</a:t>
             </a:fld>
             <a:endParaRPr lang="en-US"/>
           </a:p>
@@ -4937,7 +5338,7 @@
           <a:p>
             <a:fld id="{5958763E-B898-436D-883D-03711491D54A}" type="datetimeFigureOut">
               <a:rPr lang="en-US" smtClean="0"/>
-              <a:t>1/22/2021</a:t>
+              <a:t>1/31/2023</a:t>
             </a:fld>
             <a:endParaRPr lang="en-US"/>
           </a:p>
@@ -5356,7 +5757,7 @@
           <a:p>
             <a:fld id="{5958763E-B898-436D-883D-03711491D54A}" type="datetimeFigureOut">
               <a:rPr lang="en-US" smtClean="0"/>
-              <a:t>1/22/2021</a:t>
+              <a:t>1/31/2023</a:t>
             </a:fld>
             <a:endParaRPr lang="en-US"/>
           </a:p>
@@ -5861,7 +6262,7 @@
           <a:p>
             <a:fld id="{5958763E-B898-436D-883D-03711491D54A}" type="datetimeFigureOut">
               <a:rPr lang="en-US" smtClean="0"/>
-              <a:t>1/22/2021</a:t>
+              <a:t>1/31/2023</a:t>
             </a:fld>
             <a:endParaRPr lang="en-US"/>
           </a:p>
@@ -6314,7 +6715,7 @@
           <a:p>
             <a:fld id="{5958763E-B898-436D-883D-03711491D54A}" type="datetimeFigureOut">
               <a:rPr lang="en-US" smtClean="0"/>
-              <a:t>1/22/2021</a:t>
+              <a:t>1/31/2023</a:t>
             </a:fld>
             <a:endParaRPr lang="en-US"/>
           </a:p>
@@ -6928,7 +7329,7 @@
           <a:p>
             <a:fld id="{5958763E-B898-436D-883D-03711491D54A}" type="datetimeFigureOut">
               <a:rPr lang="en-US" smtClean="0"/>
-              <a:t>1/22/2021</a:t>
+              <a:t>1/31/2023</a:t>
             </a:fld>
             <a:endParaRPr lang="en-US"/>
           </a:p>
@@ -7703,7 +8104,7 @@
           <a:p>
             <a:fld id="{5958763E-B898-436D-883D-03711491D54A}" type="datetimeFigureOut">
               <a:rPr lang="en-US" smtClean="0"/>
-              <a:t>1/22/2021</a:t>
+              <a:t>1/31/2023</a:t>
             </a:fld>
             <a:endParaRPr lang="en-US"/>
           </a:p>
@@ -7807,7 +8208,7 @@
           <a:p>
             <a:fld id="{5958763E-B898-436D-883D-03711491D54A}" type="datetimeFigureOut">
               <a:rPr lang="en-US" smtClean="0"/>
-              <a:t>1/22/2021</a:t>
+              <a:t>1/31/2023</a:t>
             </a:fld>
             <a:endParaRPr lang="en-US"/>
           </a:p>
@@ -8136,7 +8537,7 @@
             <a:fld id="{1C2D31DE-C454-491C-B5C3-F097855E3DF7}" type="datetime4">
               <a:rPr lang="en-US" smtClean="0"/>
               <a:pPr/>
-              <a:t>January 22, 2021</a:t>
+              <a:t>January 31, 2023</a:t>
             </a:fld>
             <a:endParaRPr lang="en-US" dirty="0"/>
           </a:p>
@@ -11288,7 +11689,7 @@
           <a:p>
             <a:fld id="{5958763E-B898-436D-883D-03711491D54A}" type="datetimeFigureOut">
               <a:rPr lang="en-US" smtClean="0"/>
-              <a:t>1/22/2021</a:t>
+              <a:t>1/31/2023</a:t>
             </a:fld>
             <a:endParaRPr lang="en-US"/>
           </a:p>
@@ -11412,7 +11813,7 @@
           <a:p>
             <a:fld id="{5958763E-B898-436D-883D-03711491D54A}" type="datetimeFigureOut">
               <a:rPr lang="en-US" smtClean="0"/>
-              <a:t>1/22/2021</a:t>
+              <a:t>1/31/2023</a:t>
             </a:fld>
             <a:endParaRPr lang="en-US"/>
           </a:p>
@@ -11536,7 +11937,7 @@
           <a:p>
             <a:fld id="{5958763E-B898-436D-883D-03711491D54A}" type="datetimeFigureOut">
               <a:rPr lang="en-US" smtClean="0"/>
-              <a:t>1/22/2021</a:t>
+              <a:t>1/31/2023</a:t>
             </a:fld>
             <a:endParaRPr lang="en-US"/>
           </a:p>
@@ -11660,7 +12061,7 @@
           <a:p>
             <a:fld id="{5958763E-B898-436D-883D-03711491D54A}" type="datetimeFigureOut">
               <a:rPr lang="en-US" smtClean="0"/>
-              <a:t>1/22/2021</a:t>
+              <a:t>1/31/2023</a:t>
             </a:fld>
             <a:endParaRPr lang="en-US"/>
           </a:p>
@@ -11784,7 +12185,7 @@
           <a:p>
             <a:fld id="{5958763E-B898-436D-883D-03711491D54A}" type="datetimeFigureOut">
               <a:rPr lang="en-US" smtClean="0"/>
-              <a:t>1/22/2021</a:t>
+              <a:t>1/31/2023</a:t>
             </a:fld>
             <a:endParaRPr lang="en-US"/>
           </a:p>
@@ -11908,7 +12309,7 @@
           <a:p>
             <a:fld id="{5958763E-B898-436D-883D-03711491D54A}" type="datetimeFigureOut">
               <a:rPr lang="en-US" smtClean="0"/>
-              <a:t>1/22/2021</a:t>
+              <a:t>1/31/2023</a:t>
             </a:fld>
             <a:endParaRPr lang="en-US"/>
           </a:p>
@@ -12032,7 +12433,7 @@
           <a:p>
             <a:fld id="{5958763E-B898-436D-883D-03711491D54A}" type="datetimeFigureOut">
               <a:rPr lang="en-US" smtClean="0"/>
-              <a:t>1/22/2021</a:t>
+              <a:t>1/31/2023</a:t>
             </a:fld>
             <a:endParaRPr lang="en-US"/>
           </a:p>
@@ -12156,7 +12557,7 @@
           <a:p>
             <a:fld id="{5958763E-B898-436D-883D-03711491D54A}" type="datetimeFigureOut">
               <a:rPr lang="en-US" smtClean="0"/>
-              <a:t>1/22/2021</a:t>
+              <a:t>1/31/2023</a:t>
             </a:fld>
             <a:endParaRPr lang="en-US"/>
           </a:p>
@@ -12289,7 +12690,7 @@
           <a:p>
             <a:fld id="{5958763E-B898-436D-883D-03711491D54A}" type="datetimeFigureOut">
               <a:rPr lang="en-US" smtClean="0"/>
-              <a:t>1/22/2021</a:t>
+              <a:t>1/31/2023</a:t>
             </a:fld>
             <a:endParaRPr lang="en-US"/>
           </a:p>
@@ -15630,7 +16031,7 @@
             <a:fld id="{1C2D31DE-C454-491C-B5C3-F097855E3DF7}" type="datetime4">
               <a:rPr lang="en-US" smtClean="0"/>
               <a:pPr/>
-              <a:t>January 22, 2021</a:t>
+              <a:t>January 31, 2023</a:t>
             </a:fld>
             <a:endParaRPr lang="en-US" dirty="0"/>
           </a:p>
@@ -27866,7 +28267,7 @@
           <a:p>
             <a:fld id="{5958763E-B898-436D-883D-03711491D54A}" type="datetimeFigureOut">
               <a:rPr lang="en-US" smtClean="0"/>
-              <a:t>1/22/2021</a:t>
+              <a:t>1/31/2023</a:t>
             </a:fld>
             <a:endParaRPr lang="en-US"/>
           </a:p>
@@ -28270,7 +28671,7 @@
           <a:p>
             <a:fld id="{5958763E-B898-436D-883D-03711491D54A}" type="datetimeFigureOut">
               <a:rPr lang="en-US" smtClean="0"/>
-              <a:t>1/22/2021</a:t>
+              <a:t>1/31/2023</a:t>
             </a:fld>
             <a:endParaRPr lang="en-US"/>
           </a:p>
@@ -28568,7 +28969,7 @@
           <a:p>
             <a:fld id="{5958763E-B898-436D-883D-03711491D54A}" type="datetimeFigureOut">
               <a:rPr lang="en-US" smtClean="0"/>
-              <a:t>1/22/2021</a:t>
+              <a:t>1/31/2023</a:t>
             </a:fld>
             <a:endParaRPr lang="en-US"/>
           </a:p>
@@ -28769,7 +29170,7 @@
           <a:p>
             <a:fld id="{5958763E-B898-436D-883D-03711491D54A}" type="datetimeFigureOut">
               <a:rPr lang="en-US" smtClean="0"/>
-              <a:t>1/22/2021</a:t>
+              <a:t>1/31/2023</a:t>
             </a:fld>
             <a:endParaRPr lang="en-US"/>
           </a:p>
@@ -29030,7 +29431,7 @@
           <a:p>
             <a:fld id="{5958763E-B898-436D-883D-03711491D54A}" type="datetimeFigureOut">
               <a:rPr lang="en-US" smtClean="0"/>
-              <a:t>1/22/2021</a:t>
+              <a:t>1/31/2023</a:t>
             </a:fld>
             <a:endParaRPr lang="en-US"/>
           </a:p>
@@ -29538,7 +29939,7 @@
           <a:p>
             <a:fld id="{5958763E-B898-436D-883D-03711491D54A}" type="datetimeFigureOut">
               <a:rPr lang="en-US" smtClean="0"/>
-              <a:t>1/22/2021</a:t>
+              <a:t>1/31/2023</a:t>
             </a:fld>
             <a:endParaRPr lang="en-US"/>
           </a:p>
@@ -30017,7 +30418,7 @@
           <a:p>
             <a:fld id="{5958763E-B898-436D-883D-03711491D54A}" type="datetimeFigureOut">
               <a:rPr lang="en-US" smtClean="0"/>
-              <a:t>1/22/2021</a:t>
+              <a:t>1/31/2023</a:t>
             </a:fld>
             <a:endParaRPr lang="en-US"/>
           </a:p>
@@ -30836,7 +31237,7 @@
           <a:p>
             <a:fld id="{5958763E-B898-436D-883D-03711491D54A}" type="datetimeFigureOut">
               <a:rPr lang="en-US" smtClean="0"/>
-              <a:t>1/22/2021</a:t>
+              <a:t>1/31/2023</a:t>
             </a:fld>
             <a:endParaRPr lang="en-US"/>
           </a:p>
@@ -31038,7 +31439,7 @@
           <a:p>
             <a:fld id="{5958763E-B898-436D-883D-03711491D54A}" type="datetimeFigureOut">
               <a:rPr lang="en-US" smtClean="0"/>
-              <a:t>1/22/2021</a:t>
+              <a:t>1/31/2023</a:t>
             </a:fld>
             <a:endParaRPr lang="en-US"/>
           </a:p>
@@ -31374,7 +31775,7 @@
           <a:p>
             <a:fld id="{5958763E-B898-436D-883D-03711491D54A}" type="datetimeFigureOut">
               <a:rPr lang="en-US" smtClean="0"/>
-              <a:t>1/22/2021</a:t>
+              <a:t>1/31/2023</a:t>
             </a:fld>
             <a:endParaRPr lang="en-US"/>
           </a:p>
@@ -31605,7 +32006,7 @@
           <a:p>
             <a:fld id="{5958763E-B898-436D-883D-03711491D54A}" type="datetimeFigureOut">
               <a:rPr lang="en-US" smtClean="0"/>
-              <a:t>1/22/2021</a:t>
+              <a:t>1/31/2023</a:t>
             </a:fld>
             <a:endParaRPr lang="en-US"/>
           </a:p>
@@ -31850,7 +32251,7 @@
           <a:p>
             <a:fld id="{5958763E-B898-436D-883D-03711491D54A}" type="datetimeFigureOut">
               <a:rPr lang="en-US" smtClean="0"/>
-              <a:t>1/22/2021</a:t>
+              <a:t>1/31/2023</a:t>
             </a:fld>
             <a:endParaRPr lang="en-US"/>
           </a:p>
@@ -32443,6 +32844,369 @@
 <file path=ppt/slides/slide2.xml><?xml version="1.0" encoding="utf-8"?>
 <p:sld xmlns:a="http://schemas.openxmlformats.org/drawingml/2006/main" xmlns:r="http://schemas.openxmlformats.org/officeDocument/2006/relationships" xmlns:p="http://schemas.openxmlformats.org/presentationml/2006/main">
   <p:cSld>
+    <p:bg>
+      <p:bgPr>
+        <a:solidFill>
+          <a:srgbClr val="7C3081"/>
+        </a:solidFill>
+        <a:effectLst/>
+      </p:bgPr>
+    </p:bg>
+    <p:spTree>
+      <p:nvGrpSpPr>
+        <p:cNvPr id="1" name=""/>
+        <p:cNvGrpSpPr/>
+        <p:nvPr/>
+      </p:nvGrpSpPr>
+      <p:grpSpPr>
+        <a:xfrm>
+          <a:off x="0" y="0"/>
+          <a:ext cx="0" cy="0"/>
+          <a:chOff x="0" y="0"/>
+          <a:chExt cx="0" cy="0"/>
+        </a:xfrm>
+      </p:grpSpPr>
+      <p:pic>
+        <p:nvPicPr>
+          <p:cNvPr id="2" name="Picture 2" descr="ChatGPT: Optimizing Language Models for Dialogue">
+            <a:extLst>
+              <a:ext uri="{FF2B5EF4-FFF2-40B4-BE49-F238E27FC236}">
+                <a16:creationId xmlns:a16="http://schemas.microsoft.com/office/drawing/2014/main" id="{293E50FF-4A65-85E7-1A60-90B7C8B23CFD}"/>
+              </a:ext>
+            </a:extLst>
+          </p:cNvPr>
+          <p:cNvPicPr>
+            <a:picLocks noChangeAspect="1" noChangeArrowheads="1"/>
+          </p:cNvPicPr>
+          <p:nvPr/>
+        </p:nvPicPr>
+        <p:blipFill rotWithShape="1">
+          <a:blip r:embed="rId3">
+            <a:alphaModFix amt="50000"/>
+            <a:extLst>
+              <a:ext uri="{28A0092B-C50C-407E-A947-70E740481C1C}">
+                <a14:useLocalDpi xmlns:a14="http://schemas.microsoft.com/office/drawing/2010/main" val="0"/>
+              </a:ext>
+            </a:extLst>
+          </a:blip>
+          <a:srcRect b="43750"/>
+          <a:stretch/>
+        </p:blipFill>
+        <p:spPr bwMode="auto">
+          <a:xfrm>
+            <a:off x="0" y="0"/>
+            <a:ext cx="12192000" cy="6858000"/>
+          </a:xfrm>
+          <a:prstGeom prst="rect">
+            <a:avLst/>
+          </a:prstGeom>
+          <a:noFill/>
+          <a:extLst>
+            <a:ext uri="{909E8E84-426E-40DD-AFC4-6F175D3DCCD1}">
+              <a14:hiddenFill xmlns:a14="http://schemas.microsoft.com/office/drawing/2010/main">
+                <a:solidFill>
+                  <a:srgbClr val="FFFFFF"/>
+                </a:solidFill>
+              </a14:hiddenFill>
+            </a:ext>
+          </a:extLst>
+        </p:spPr>
+      </p:pic>
+      <p:sp>
+        <p:nvSpPr>
+          <p:cNvPr id="3" name="Title 3">
+            <a:extLst>
+              <a:ext uri="{FF2B5EF4-FFF2-40B4-BE49-F238E27FC236}">
+                <a16:creationId xmlns:a16="http://schemas.microsoft.com/office/drawing/2014/main" id="{C9C5F4D4-E449-47E4-9969-33627F7A69A2}"/>
+              </a:ext>
+            </a:extLst>
+          </p:cNvPr>
+          <p:cNvSpPr txBox="1">
+            <a:spLocks/>
+          </p:cNvSpPr>
+          <p:nvPr/>
+        </p:nvSpPr>
+        <p:spPr>
+          <a:xfrm>
+            <a:off x="1066800" y="2285999"/>
+            <a:ext cx="10972800" cy="990600"/>
+          </a:xfrm>
+          <a:prstGeom prst="rect">
+            <a:avLst/>
+          </a:prstGeom>
+        </p:spPr>
+        <p:txBody>
+          <a:bodyPr/>
+          <a:lstStyle>
+            <a:lvl1pPr algn="l" defTabSz="914400" rtl="0" eaLnBrk="1" latinLnBrk="0" hangingPunct="1">
+              <a:lnSpc>
+                <a:spcPct val="90000"/>
+              </a:lnSpc>
+              <a:spcBef>
+                <a:spcPct val="0"/>
+              </a:spcBef>
+              <a:buNone/>
+              <a:defRPr sz="3200" b="1" kern="1200" cap="all" baseline="0">
+                <a:solidFill>
+                  <a:schemeClr val="tx1"/>
+                </a:solidFill>
+                <a:latin typeface="+mj-lt"/>
+                <a:ea typeface="+mj-ea"/>
+                <a:cs typeface="+mj-cs"/>
+              </a:defRPr>
+            </a:lvl1pPr>
+          </a:lstStyle>
+          <a:p>
+            <a:r>
+              <a:rPr lang="en-US" sz="6600" dirty="0">
+                <a:solidFill>
+                  <a:srgbClr val="CDCDCD"/>
+                </a:solidFill>
+              </a:rPr>
+              <a:t>What is a chat bot?</a:t>
+            </a:r>
+          </a:p>
+        </p:txBody>
+      </p:sp>
+      <p:pic>
+        <p:nvPicPr>
+          <p:cNvPr id="2050" name="Picture 2" descr="OpenAi - No Code Tool Overview - No Code MBA">
+            <a:extLst>
+              <a:ext uri="{FF2B5EF4-FFF2-40B4-BE49-F238E27FC236}">
+                <a16:creationId xmlns:a16="http://schemas.microsoft.com/office/drawing/2014/main" id="{342DF676-C48B-0CB1-A52C-5D9EA322EEA3}"/>
+              </a:ext>
+            </a:extLst>
+          </p:cNvPr>
+          <p:cNvPicPr>
+            <a:picLocks noChangeAspect="1" noChangeArrowheads="1"/>
+          </p:cNvPicPr>
+          <p:nvPr/>
+        </p:nvPicPr>
+        <p:blipFill>
+          <a:blip r:embed="rId4">
+            <a:lum bright="70000" contrast="-70000"/>
+            <a:extLst>
+              <a:ext uri="{28A0092B-C50C-407E-A947-70E740481C1C}">
+                <a14:useLocalDpi xmlns:a14="http://schemas.microsoft.com/office/drawing/2010/main" val="0"/>
+              </a:ext>
+            </a:extLst>
+          </a:blip>
+          <a:srcRect/>
+          <a:stretch>
+            <a:fillRect/>
+          </a:stretch>
+        </p:blipFill>
+        <p:spPr bwMode="auto">
+          <a:xfrm>
+            <a:off x="8610600" y="3638549"/>
+            <a:ext cx="2819400" cy="2857500"/>
+          </a:xfrm>
+          <a:prstGeom prst="rect">
+            <a:avLst/>
+          </a:prstGeom>
+          <a:noFill/>
+          <a:extLst>
+            <a:ext uri="{909E8E84-426E-40DD-AFC4-6F175D3DCCD1}">
+              <a14:hiddenFill xmlns:a14="http://schemas.microsoft.com/office/drawing/2010/main">
+                <a:solidFill>
+                  <a:srgbClr val="FFFFFF"/>
+                </a:solidFill>
+              </a14:hiddenFill>
+            </a:ext>
+          </a:extLst>
+        </p:spPr>
+      </p:pic>
+      <p:sp>
+        <p:nvSpPr>
+          <p:cNvPr id="5" name="TextBox 4">
+            <a:extLst>
+              <a:ext uri="{FF2B5EF4-FFF2-40B4-BE49-F238E27FC236}">
+                <a16:creationId xmlns:a16="http://schemas.microsoft.com/office/drawing/2014/main" id="{67EC2852-0762-F142-7A30-327BA884C8D2}"/>
+              </a:ext>
+            </a:extLst>
+          </p:cNvPr>
+          <p:cNvSpPr txBox="1"/>
+          <p:nvPr/>
+        </p:nvSpPr>
+        <p:spPr>
+          <a:xfrm>
+            <a:off x="1981200" y="5541934"/>
+            <a:ext cx="6895454" cy="769441"/>
+          </a:xfrm>
+          <a:prstGeom prst="rect">
+            <a:avLst/>
+          </a:prstGeom>
+          <a:noFill/>
+        </p:spPr>
+        <p:txBody>
+          <a:bodyPr wrap="square">
+            <a:spAutoFit/>
+          </a:bodyPr>
+          <a:lstStyle/>
+          <a:p>
+            <a:r>
+              <a:rPr lang="en-US" sz="4400" b="1" dirty="0">
+                <a:solidFill>
+                  <a:srgbClr val="CDCDCD"/>
+                </a:solidFill>
+                <a:hlinkClick r:id="rId5">
+                  <a:extLst>
+                    <a:ext uri="{A12FA001-AC4F-418D-AE19-62706E023703}">
+                      <ahyp:hlinkClr xmlns:ahyp="http://schemas.microsoft.com/office/drawing/2018/hyperlinkcolor" val="tx"/>
+                    </a:ext>
+                  </a:extLst>
+                </a:hlinkClick>
+              </a:rPr>
+              <a:t>https://chat.openai.com/</a:t>
+            </a:r>
+            <a:endParaRPr lang="en-US" sz="4400" b="1" dirty="0">
+              <a:solidFill>
+                <a:srgbClr val="CDCDCD"/>
+              </a:solidFill>
+            </a:endParaRPr>
+          </a:p>
+        </p:txBody>
+      </p:sp>
+    </p:spTree>
+    <p:extLst>
+      <p:ext uri="{BB962C8B-B14F-4D97-AF65-F5344CB8AC3E}">
+        <p14:creationId xmlns:p14="http://schemas.microsoft.com/office/powerpoint/2010/main" val="38142545"/>
+      </p:ext>
+    </p:extLst>
+  </p:cSld>
+  <p:clrMapOvr>
+    <a:masterClrMapping/>
+  </p:clrMapOvr>
+  <p:transition>
+    <p:fade/>
+  </p:transition>
+  <p:timing>
+    <p:tnLst>
+      <p:par>
+        <p:cTn id="1" dur="indefinite" restart="never" nodeType="tmRoot">
+          <p:childTnLst>
+            <p:seq concurrent="1" nextAc="seek">
+              <p:cTn id="2" dur="indefinite" nodeType="mainSeq">
+                <p:childTnLst>
+                  <p:par>
+                    <p:cTn id="3" fill="hold">
+                      <p:stCondLst>
+                        <p:cond delay="indefinite"/>
+                      </p:stCondLst>
+                      <p:childTnLst>
+                        <p:par>
+                          <p:cTn id="4" fill="hold">
+                            <p:stCondLst>
+                              <p:cond delay="0"/>
+                            </p:stCondLst>
+                            <p:childTnLst>
+                              <p:par>
+                                <p:cTn id="5" presetID="10" presetClass="entr" presetSubtype="0" fill="hold" nodeType="clickEffect">
+                                  <p:stCondLst>
+                                    <p:cond delay="0"/>
+                                  </p:stCondLst>
+                                  <p:childTnLst>
+                                    <p:set>
+                                      <p:cBhvr>
+                                        <p:cTn id="6" dur="1" fill="hold">
+                                          <p:stCondLst>
+                                            <p:cond delay="0"/>
+                                          </p:stCondLst>
+                                        </p:cTn>
+                                        <p:tgtEl>
+                                          <p:spTgt spid="2050"/>
+                                        </p:tgtEl>
+                                        <p:attrNameLst>
+                                          <p:attrName>style.visibility</p:attrName>
+                                        </p:attrNameLst>
+                                      </p:cBhvr>
+                                      <p:to>
+                                        <p:strVal val="visible"/>
+                                      </p:to>
+                                    </p:set>
+                                    <p:animEffect transition="in" filter="fade">
+                                      <p:cBhvr>
+                                        <p:cTn id="7" dur="500"/>
+                                        <p:tgtEl>
+                                          <p:spTgt spid="2050"/>
+                                        </p:tgtEl>
+                                      </p:cBhvr>
+                                    </p:animEffect>
+                                  </p:childTnLst>
+                                </p:cTn>
+                              </p:par>
+                              <p:par>
+                                <p:cTn id="8" presetID="10" presetClass="entr" presetSubtype="0" fill="hold" grpId="0" nodeType="withEffect">
+                                  <p:stCondLst>
+                                    <p:cond delay="0"/>
+                                  </p:stCondLst>
+                                  <p:childTnLst>
+                                    <p:set>
+                                      <p:cBhvr>
+                                        <p:cTn id="9" dur="1" fill="hold">
+                                          <p:stCondLst>
+                                            <p:cond delay="0"/>
+                                          </p:stCondLst>
+                                        </p:cTn>
+                                        <p:tgtEl>
+                                          <p:spTgt spid="5"/>
+                                        </p:tgtEl>
+                                        <p:attrNameLst>
+                                          <p:attrName>style.visibility</p:attrName>
+                                        </p:attrNameLst>
+                                      </p:cBhvr>
+                                      <p:to>
+                                        <p:strVal val="visible"/>
+                                      </p:to>
+                                    </p:set>
+                                    <p:animEffect transition="in" filter="fade">
+                                      <p:cBhvr>
+                                        <p:cTn id="10" dur="500"/>
+                                        <p:tgtEl>
+                                          <p:spTgt spid="5"/>
+                                        </p:tgtEl>
+                                      </p:cBhvr>
+                                    </p:animEffect>
+                                  </p:childTnLst>
+                                </p:cTn>
+                              </p:par>
+                            </p:childTnLst>
+                          </p:cTn>
+                        </p:par>
+                      </p:childTnLst>
+                    </p:cTn>
+                  </p:par>
+                </p:childTnLst>
+              </p:cTn>
+              <p:prevCondLst>
+                <p:cond evt="onPrev" delay="0">
+                  <p:tgtEl>
+                    <p:sldTgt/>
+                  </p:tgtEl>
+                </p:cond>
+              </p:prevCondLst>
+              <p:nextCondLst>
+                <p:cond evt="onNext" delay="0">
+                  <p:tgtEl>
+                    <p:sldTgt/>
+                  </p:tgtEl>
+                </p:cond>
+              </p:nextCondLst>
+            </p:seq>
+          </p:childTnLst>
+        </p:cTn>
+      </p:par>
+    </p:tnLst>
+    <p:bldLst>
+      <p:bldP spid="5" grpId="0"/>
+    </p:bldLst>
+  </p:timing>
+</p:sld>
+</file>
+
+<file path=ppt/slides/slide3.xml><?xml version="1.0" encoding="utf-8"?>
+<p:sld xmlns:a="http://schemas.openxmlformats.org/drawingml/2006/main" xmlns:r="http://schemas.openxmlformats.org/officeDocument/2006/relationships" xmlns:p="http://schemas.openxmlformats.org/presentationml/2006/main">
+  <p:cSld>
     <p:spTree>
       <p:nvGrpSpPr>
         <p:cNvPr id="1" name=""/>
@@ -32584,7 +33348,7 @@
             <a:fld id="{1C2D31DE-C454-491C-B5C3-F097855E3DF7}" type="datetime4">
               <a:rPr lang="en-US" smtClean="0"/>
               <a:pPr/>
-              <a:t>January 22, 2021</a:t>
+              <a:t>January 31, 2023</a:t>
             </a:fld>
             <a:endParaRPr lang="en-US" dirty="0"/>
           </a:p>
@@ -32605,7 +33369,7 @@
           <p:nvPr/>
         </p:nvPicPr>
         <p:blipFill>
-          <a:blip r:embed="rId2">
+          <a:blip r:embed="rId3">
             <a:extLst>
               <a:ext uri="{28A0092B-C50C-407E-A947-70E740481C1C}">
                 <a14:useLocalDpi xmlns:a14="http://schemas.microsoft.com/office/drawing/2010/main" val="0"/>
@@ -32641,7 +33405,7 @@
           <p:nvPr/>
         </p:nvPicPr>
         <p:blipFill>
-          <a:blip r:embed="rId3">
+          <a:blip r:embed="rId4">
             <a:extLst>
               <a:ext uri="{28A0092B-C50C-407E-A947-70E740481C1C}">
                 <a14:useLocalDpi xmlns:a14="http://schemas.microsoft.com/office/drawing/2010/main" val="0"/>
@@ -32677,7 +33441,7 @@
           <p:nvPr/>
         </p:nvPicPr>
         <p:blipFill>
-          <a:blip r:embed="rId4">
+          <a:blip r:embed="rId5">
             <a:extLst>
               <a:ext uri="{28A0092B-C50C-407E-A947-70E740481C1C}">
                 <a14:useLocalDpi xmlns:a14="http://schemas.microsoft.com/office/drawing/2010/main" val="0"/>
@@ -32711,10 +33475,364 @@
   <p:transition>
     <p:fade/>
   </p:transition>
+  <p:timing>
+    <p:tnLst>
+      <p:par>
+        <p:cTn id="1" dur="indefinite" restart="never" nodeType="tmRoot">
+          <p:childTnLst>
+            <p:seq concurrent="1" nextAc="seek">
+              <p:cTn id="2" dur="indefinite" nodeType="mainSeq">
+                <p:childTnLst>
+                  <p:par>
+                    <p:cTn id="3" fill="hold">
+                      <p:stCondLst>
+                        <p:cond delay="indefinite"/>
+                      </p:stCondLst>
+                      <p:childTnLst>
+                        <p:par>
+                          <p:cTn id="4" fill="hold">
+                            <p:stCondLst>
+                              <p:cond delay="0"/>
+                            </p:stCondLst>
+                            <p:childTnLst>
+                              <p:par>
+                                <p:cTn id="5" presetID="10" presetClass="entr" presetSubtype="0" fill="hold" nodeType="clickEffect">
+                                  <p:stCondLst>
+                                    <p:cond delay="0"/>
+                                  </p:stCondLst>
+                                  <p:childTnLst>
+                                    <p:set>
+                                      <p:cBhvr>
+                                        <p:cTn id="6" dur="1" fill="hold">
+                                          <p:stCondLst>
+                                            <p:cond delay="0"/>
+                                          </p:stCondLst>
+                                        </p:cTn>
+                                        <p:tgtEl>
+                                          <p:spTgt spid="10"/>
+                                        </p:tgtEl>
+                                        <p:attrNameLst>
+                                          <p:attrName>style.visibility</p:attrName>
+                                        </p:attrNameLst>
+                                      </p:cBhvr>
+                                      <p:to>
+                                        <p:strVal val="visible"/>
+                                      </p:to>
+                                    </p:set>
+                                    <p:animEffect transition="in" filter="fade">
+                                      <p:cBhvr>
+                                        <p:cTn id="7" dur="500"/>
+                                        <p:tgtEl>
+                                          <p:spTgt spid="10"/>
+                                        </p:tgtEl>
+                                      </p:cBhvr>
+                                    </p:animEffect>
+                                  </p:childTnLst>
+                                </p:cTn>
+                              </p:par>
+                            </p:childTnLst>
+                          </p:cTn>
+                        </p:par>
+                        <p:par>
+                          <p:cTn id="8" fill="hold">
+                            <p:stCondLst>
+                              <p:cond delay="500"/>
+                            </p:stCondLst>
+                            <p:childTnLst>
+                              <p:par>
+                                <p:cTn id="9" presetID="10" presetClass="entr" presetSubtype="0" fill="hold" nodeType="afterEffect">
+                                  <p:stCondLst>
+                                    <p:cond delay="0"/>
+                                  </p:stCondLst>
+                                  <p:childTnLst>
+                                    <p:set>
+                                      <p:cBhvr>
+                                        <p:cTn id="10" dur="1" fill="hold">
+                                          <p:stCondLst>
+                                            <p:cond delay="0"/>
+                                          </p:stCondLst>
+                                        </p:cTn>
+                                        <p:tgtEl>
+                                          <p:spTgt spid="9"/>
+                                        </p:tgtEl>
+                                        <p:attrNameLst>
+                                          <p:attrName>style.visibility</p:attrName>
+                                        </p:attrNameLst>
+                                      </p:cBhvr>
+                                      <p:to>
+                                        <p:strVal val="visible"/>
+                                      </p:to>
+                                    </p:set>
+                                    <p:animEffect transition="in" filter="fade">
+                                      <p:cBhvr>
+                                        <p:cTn id="11" dur="500"/>
+                                        <p:tgtEl>
+                                          <p:spTgt spid="9"/>
+                                        </p:tgtEl>
+                                      </p:cBhvr>
+                                    </p:animEffect>
+                                  </p:childTnLst>
+                                </p:cTn>
+                              </p:par>
+                            </p:childTnLst>
+                          </p:cTn>
+                        </p:par>
+                        <p:par>
+                          <p:cTn id="12" fill="hold">
+                            <p:stCondLst>
+                              <p:cond delay="1000"/>
+                            </p:stCondLst>
+                            <p:childTnLst>
+                              <p:par>
+                                <p:cTn id="13" presetID="10" presetClass="entr" presetSubtype="0" fill="hold" nodeType="afterEffect">
+                                  <p:stCondLst>
+                                    <p:cond delay="0"/>
+                                  </p:stCondLst>
+                                  <p:childTnLst>
+                                    <p:set>
+                                      <p:cBhvr>
+                                        <p:cTn id="14" dur="1" fill="hold">
+                                          <p:stCondLst>
+                                            <p:cond delay="0"/>
+                                          </p:stCondLst>
+                                        </p:cTn>
+                                        <p:tgtEl>
+                                          <p:spTgt spid="8"/>
+                                        </p:tgtEl>
+                                        <p:attrNameLst>
+                                          <p:attrName>style.visibility</p:attrName>
+                                        </p:attrNameLst>
+                                      </p:cBhvr>
+                                      <p:to>
+                                        <p:strVal val="visible"/>
+                                      </p:to>
+                                    </p:set>
+                                    <p:animEffect transition="in" filter="fade">
+                                      <p:cBhvr>
+                                        <p:cTn id="15" dur="500"/>
+                                        <p:tgtEl>
+                                          <p:spTgt spid="8"/>
+                                        </p:tgtEl>
+                                      </p:cBhvr>
+                                    </p:animEffect>
+                                  </p:childTnLst>
+                                </p:cTn>
+                              </p:par>
+                            </p:childTnLst>
+                          </p:cTn>
+                        </p:par>
+                      </p:childTnLst>
+                    </p:cTn>
+                  </p:par>
+                  <p:par>
+                    <p:cTn id="16" fill="hold">
+                      <p:stCondLst>
+                        <p:cond delay="indefinite"/>
+                      </p:stCondLst>
+                      <p:childTnLst>
+                        <p:par>
+                          <p:cTn id="17" fill="hold">
+                            <p:stCondLst>
+                              <p:cond delay="0"/>
+                            </p:stCondLst>
+                            <p:childTnLst>
+                              <p:par>
+                                <p:cTn id="18" presetID="10" presetClass="entr" presetSubtype="0" fill="hold" nodeType="clickEffect">
+                                  <p:stCondLst>
+                                    <p:cond delay="0"/>
+                                  </p:stCondLst>
+                                  <p:childTnLst>
+                                    <p:set>
+                                      <p:cBhvr>
+                                        <p:cTn id="19" dur="1" fill="hold">
+                                          <p:stCondLst>
+                                            <p:cond delay="0"/>
+                                          </p:stCondLst>
+                                        </p:cTn>
+                                        <p:tgtEl>
+                                          <p:spTgt spid="7">
+                                            <p:txEl>
+                                              <p:pRg st="0" end="0"/>
+                                            </p:txEl>
+                                          </p:spTgt>
+                                        </p:tgtEl>
+                                        <p:attrNameLst>
+                                          <p:attrName>style.visibility</p:attrName>
+                                        </p:attrNameLst>
+                                      </p:cBhvr>
+                                      <p:to>
+                                        <p:strVal val="visible"/>
+                                      </p:to>
+                                    </p:set>
+                                    <p:animEffect transition="in" filter="fade">
+                                      <p:cBhvr>
+                                        <p:cTn id="20" dur="500"/>
+                                        <p:tgtEl>
+                                          <p:spTgt spid="7">
+                                            <p:txEl>
+                                              <p:pRg st="0" end="0"/>
+                                            </p:txEl>
+                                          </p:spTgt>
+                                        </p:tgtEl>
+                                      </p:cBhvr>
+                                    </p:animEffect>
+                                  </p:childTnLst>
+                                </p:cTn>
+                              </p:par>
+                            </p:childTnLst>
+                          </p:cTn>
+                        </p:par>
+                      </p:childTnLst>
+                    </p:cTn>
+                  </p:par>
+                  <p:par>
+                    <p:cTn id="21" fill="hold">
+                      <p:stCondLst>
+                        <p:cond delay="indefinite"/>
+                      </p:stCondLst>
+                      <p:childTnLst>
+                        <p:par>
+                          <p:cTn id="22" fill="hold">
+                            <p:stCondLst>
+                              <p:cond delay="0"/>
+                            </p:stCondLst>
+                            <p:childTnLst>
+                              <p:par>
+                                <p:cTn id="23" presetID="10" presetClass="entr" presetSubtype="0" fill="hold" nodeType="clickEffect">
+                                  <p:stCondLst>
+                                    <p:cond delay="0"/>
+                                  </p:stCondLst>
+                                  <p:childTnLst>
+                                    <p:set>
+                                      <p:cBhvr>
+                                        <p:cTn id="24" dur="1" fill="hold">
+                                          <p:stCondLst>
+                                            <p:cond delay="0"/>
+                                          </p:stCondLst>
+                                        </p:cTn>
+                                        <p:tgtEl>
+                                          <p:spTgt spid="7">
+                                            <p:txEl>
+                                              <p:pRg st="1" end="1"/>
+                                            </p:txEl>
+                                          </p:spTgt>
+                                        </p:tgtEl>
+                                        <p:attrNameLst>
+                                          <p:attrName>style.visibility</p:attrName>
+                                        </p:attrNameLst>
+                                      </p:cBhvr>
+                                      <p:to>
+                                        <p:strVal val="visible"/>
+                                      </p:to>
+                                    </p:set>
+                                    <p:animEffect transition="in" filter="fade">
+                                      <p:cBhvr>
+                                        <p:cTn id="25" dur="500"/>
+                                        <p:tgtEl>
+                                          <p:spTgt spid="7">
+                                            <p:txEl>
+                                              <p:pRg st="1" end="1"/>
+                                            </p:txEl>
+                                          </p:spTgt>
+                                        </p:tgtEl>
+                                      </p:cBhvr>
+                                    </p:animEffect>
+                                  </p:childTnLst>
+                                </p:cTn>
+                              </p:par>
+                            </p:childTnLst>
+                          </p:cTn>
+                        </p:par>
+                      </p:childTnLst>
+                    </p:cTn>
+                  </p:par>
+                  <p:par>
+                    <p:cTn id="26" fill="hold">
+                      <p:stCondLst>
+                        <p:cond delay="indefinite"/>
+                      </p:stCondLst>
+                      <p:childTnLst>
+                        <p:par>
+                          <p:cTn id="27" fill="hold">
+                            <p:stCondLst>
+                              <p:cond delay="0"/>
+                            </p:stCondLst>
+                            <p:childTnLst>
+                              <p:par>
+                                <p:cTn id="28" presetID="10" presetClass="entr" presetSubtype="0" fill="hold" nodeType="clickEffect">
+                                  <p:stCondLst>
+                                    <p:cond delay="0"/>
+                                  </p:stCondLst>
+                                  <p:childTnLst>
+                                    <p:set>
+                                      <p:cBhvr>
+                                        <p:cTn id="29" dur="1" fill="hold">
+                                          <p:stCondLst>
+                                            <p:cond delay="0"/>
+                                          </p:stCondLst>
+                                        </p:cTn>
+                                        <p:tgtEl>
+                                          <p:spTgt spid="7">
+                                            <p:txEl>
+                                              <p:pRg st="2" end="2"/>
+                                            </p:txEl>
+                                          </p:spTgt>
+                                        </p:tgtEl>
+                                        <p:attrNameLst>
+                                          <p:attrName>style.visibility</p:attrName>
+                                        </p:attrNameLst>
+                                      </p:cBhvr>
+                                      <p:to>
+                                        <p:strVal val="visible"/>
+                                      </p:to>
+                                    </p:set>
+                                    <p:animEffect transition="in" filter="fade">
+                                      <p:cBhvr>
+                                        <p:cTn id="30" dur="500"/>
+                                        <p:tgtEl>
+                                          <p:spTgt spid="7">
+                                            <p:txEl>
+                                              <p:pRg st="2" end="2"/>
+                                            </p:txEl>
+                                          </p:spTgt>
+                                        </p:tgtEl>
+                                      </p:cBhvr>
+                                    </p:animEffect>
+                                  </p:childTnLst>
+                                </p:cTn>
+                              </p:par>
+                            </p:childTnLst>
+                          </p:cTn>
+                        </p:par>
+                      </p:childTnLst>
+                    </p:cTn>
+                  </p:par>
+                </p:childTnLst>
+              </p:cTn>
+              <p:prevCondLst>
+                <p:cond evt="onPrev" delay="0">
+                  <p:tgtEl>
+                    <p:sldTgt/>
+                  </p:tgtEl>
+                </p:cond>
+              </p:prevCondLst>
+              <p:nextCondLst>
+                <p:cond evt="onNext" delay="0">
+                  <p:tgtEl>
+                    <p:sldTgt/>
+                  </p:tgtEl>
+                </p:cond>
+              </p:nextCondLst>
+            </p:seq>
+          </p:childTnLst>
+        </p:cTn>
+      </p:par>
+    </p:tnLst>
+  </p:timing>
 </p:sld>
 </file>
 
-<file path=ppt/slides/slide3.xml><?xml version="1.0" encoding="utf-8"?>
+<file path=ppt/slides/slide4.xml><?xml version="1.0" encoding="utf-8"?>
 <p:sld xmlns:a="http://schemas.openxmlformats.org/drawingml/2006/main" xmlns:r="http://schemas.openxmlformats.org/officeDocument/2006/relationships" xmlns:p="http://schemas.openxmlformats.org/presentationml/2006/main">
   <p:cSld>
     <p:spTree>
@@ -32818,7 +33936,7 @@
             <a:fld id="{1C2D31DE-C454-491C-B5C3-F097855E3DF7}" type="datetime4">
               <a:rPr lang="en-US" smtClean="0"/>
               <a:pPr/>
-              <a:t>January 22, 2021</a:t>
+              <a:t>January 31, 2023</a:t>
             </a:fld>
             <a:endParaRPr lang="en-US" dirty="0"/>
           </a:p>
@@ -32839,7 +33957,7 @@
         <p:spPr>
           <a:xfrm>
             <a:off x="381000" y="4267200"/>
-            <a:ext cx="11201400" cy="2403735"/>
+            <a:ext cx="11201400" cy="1938992"/>
           </a:xfrm>
           <a:prstGeom prst="rect">
             <a:avLst/>
@@ -32852,130 +33970,127 @@
           </a:bodyPr>
           <a:lstStyle/>
           <a:p>
-            <a:pPr marL="571500" indent="-571500">
+            <a:pPr marL="457200" indent="-457200">
               <a:lnSpc>
                 <a:spcPct val="90000"/>
               </a:lnSpc>
               <a:spcAft>
                 <a:spcPts val="600"/>
               </a:spcAft>
-              <a:buFont typeface="Arial" panose="020B0604020202020204" pitchFamily="34" charset="0"/>
-              <a:buChar char="•"/>
+              <a:buClr>
+                <a:schemeClr val="tx2">
+                  <a:lumMod val="60000"/>
+                  <a:lumOff val="40000"/>
+                </a:schemeClr>
+              </a:buClr>
+              <a:buFont typeface="Wingdings" panose="05000000000000000000" pitchFamily="2" charset="2"/>
+              <a:buChar char="§"/>
             </a:pPr>
             <a:r>
               <a:rPr lang="en-US" sz="2800" dirty="0">
-                <a:solidFill>
-                  <a:srgbClr val="292929"/>
-                </a:solidFill>
-                <a:latin typeface="charter"/>
+                <a:latin typeface="+mj-lt"/>
               </a:rPr>
               <a:t>D</a:t>
             </a:r>
             <a:r>
               <a:rPr lang="en-US" sz="2800" b="0" i="0" dirty="0">
-                <a:solidFill>
-                  <a:srgbClr val="292929"/>
-                </a:solidFill>
                 <a:effectLst/>
-                <a:latin typeface="charter"/>
+                <a:latin typeface="+mj-lt"/>
               </a:rPr>
               <a:t>eveloped by MIT professor Joseph </a:t>
             </a:r>
             <a:r>
               <a:rPr lang="en-US" sz="2800" b="0" i="0" dirty="0" err="1">
-                <a:solidFill>
-                  <a:srgbClr val="292929"/>
-                </a:solidFill>
                 <a:effectLst/>
-                <a:latin typeface="charter"/>
+                <a:latin typeface="+mj-lt"/>
               </a:rPr>
               <a:t>Weizenbaum</a:t>
             </a:r>
             <a:r>
               <a:rPr lang="en-US" sz="2800" b="0" i="0" dirty="0">
-                <a:solidFill>
-                  <a:srgbClr val="292929"/>
-                </a:solidFill>
                 <a:effectLst/>
-                <a:latin typeface="charter"/>
+                <a:latin typeface="+mj-lt"/>
               </a:rPr>
               <a:t> in the 1960s</a:t>
             </a:r>
           </a:p>
           <a:p>
-            <a:pPr marL="571500" indent="-571500">
+            <a:pPr marL="457200" indent="-457200">
               <a:lnSpc>
                 <a:spcPct val="90000"/>
               </a:lnSpc>
               <a:spcAft>
                 <a:spcPts val="600"/>
               </a:spcAft>
-              <a:buFont typeface="Arial" panose="020B0604020202020204" pitchFamily="34" charset="0"/>
-              <a:buChar char="•"/>
+              <a:buClr>
+                <a:schemeClr val="tx2">
+                  <a:lumMod val="60000"/>
+                  <a:lumOff val="40000"/>
+                </a:schemeClr>
+              </a:buClr>
+              <a:buFont typeface="Wingdings" panose="05000000000000000000" pitchFamily="2" charset="2"/>
+              <a:buChar char="§"/>
             </a:pPr>
             <a:r>
-              <a:rPr lang="en-US" sz="2800" dirty="0"/>
-              <a:t>Powered by scripts to determine responses, called MAD-Slip</a:t>
+              <a:rPr lang="en-US" sz="2800" dirty="0">
+                <a:latin typeface="+mj-lt"/>
+              </a:rPr>
+              <a:t>Most well-known ELIZA script was DOCTOR</a:t>
             </a:r>
           </a:p>
           <a:p>
-            <a:pPr marL="571500" indent="-571500">
+            <a:pPr marL="914400" lvl="1" indent="-457200">
               <a:lnSpc>
                 <a:spcPct val="90000"/>
               </a:lnSpc>
               <a:spcAft>
                 <a:spcPts val="600"/>
               </a:spcAft>
-              <a:buFont typeface="Arial" panose="020B0604020202020204" pitchFamily="34" charset="0"/>
-              <a:buChar char="•"/>
-            </a:pPr>
-            <a:r>
-              <a:rPr lang="en-US" sz="2800" dirty="0"/>
-              <a:t>Most well-known ELIZA script was DOCTOR</a:t>
-            </a:r>
-          </a:p>
-          <a:p>
-            <a:pPr marL="1028700" lvl="1" indent="-571500">
-              <a:lnSpc>
-                <a:spcPct val="90000"/>
-              </a:lnSpc>
-              <a:spcAft>
-                <a:spcPts val="600"/>
-              </a:spcAft>
-              <a:buFont typeface="Arial" panose="020B0604020202020204" pitchFamily="34" charset="0"/>
-              <a:buChar char="•"/>
+              <a:buClr>
+                <a:schemeClr val="tx2">
+                  <a:lumMod val="60000"/>
+                  <a:lumOff val="40000"/>
+                </a:schemeClr>
+              </a:buClr>
+              <a:buFont typeface="Wingdings" panose="05000000000000000000" pitchFamily="2" charset="2"/>
+              <a:buChar char="§"/>
             </a:pPr>
             <a:r>
               <a:rPr lang="en-US" sz="2800" dirty="0">
-                <a:solidFill>
-                  <a:srgbClr val="202122"/>
-                </a:solidFill>
-                <a:latin typeface="Arial" panose="020B0604020202020204" pitchFamily="34" charset="0"/>
+                <a:latin typeface="+mj-lt"/>
               </a:rPr>
               <a:t>Simulation of the psychotherapist</a:t>
             </a:r>
             <a:r>
               <a:rPr lang="en-US" sz="2800" b="0" i="0" dirty="0">
-                <a:solidFill>
-                  <a:srgbClr val="202122"/>
-                </a:solidFill>
                 <a:effectLst/>
-                <a:latin typeface="Arial" panose="020B0604020202020204" pitchFamily="34" charset="0"/>
+                <a:latin typeface="+mj-lt"/>
               </a:rPr>
               <a:t> </a:t>
             </a:r>
             <a:r>
               <a:rPr lang="en-US" sz="2800" b="0" i="0" u="none" strike="noStrike" dirty="0">
                 <a:solidFill>
-                  <a:srgbClr val="0B0080"/>
+                  <a:schemeClr val="accent2"/>
                 </a:solidFill>
                 <a:effectLst/>
-                <a:latin typeface="Arial" panose="020B0604020202020204" pitchFamily="34" charset="0"/>
-                <a:hlinkClick r:id="rId4" tooltip="Carl Rogers"/>
+                <a:latin typeface="+mj-lt"/>
+                <a:hlinkClick r:id="rId4" tooltip="Carl Rogers">
+                  <a:extLst>
+                    <a:ext uri="{A12FA001-AC4F-418D-AE19-62706E023703}">
+                      <ahyp:hlinkClr xmlns:ahyp="http://schemas.microsoft.com/office/drawing/2018/hyperlinkcolor" val="tx"/>
+                    </a:ext>
+                  </a:extLst>
+                </a:hlinkClick>
               </a:rPr>
               <a:t>Carl Rogers</a:t>
             </a:r>
-            <a:endParaRPr lang="en-US" sz="2800" dirty="0"/>
+            <a:endParaRPr lang="en-US" sz="2800" dirty="0">
+              <a:solidFill>
+                <a:schemeClr val="accent2"/>
+              </a:solidFill>
+              <a:latin typeface="+mj-lt"/>
+            </a:endParaRPr>
           </a:p>
           <a:p>
             <a:pPr marL="342900" indent="-342900">
@@ -33017,10 +34132,258 @@
   <p:transition>
     <p:fade/>
   </p:transition>
+  <p:timing>
+    <p:tnLst>
+      <p:par>
+        <p:cTn id="1" dur="indefinite" restart="never" nodeType="tmRoot">
+          <p:childTnLst>
+            <p:seq concurrent="1" nextAc="seek">
+              <p:cTn id="2" dur="indefinite" nodeType="mainSeq">
+                <p:childTnLst>
+                  <p:par>
+                    <p:cTn id="3" fill="hold">
+                      <p:stCondLst>
+                        <p:cond delay="indefinite"/>
+                      </p:stCondLst>
+                      <p:childTnLst>
+                        <p:par>
+                          <p:cTn id="4" fill="hold">
+                            <p:stCondLst>
+                              <p:cond delay="0"/>
+                            </p:stCondLst>
+                            <p:childTnLst>
+                              <p:par>
+                                <p:cTn id="5" presetID="10" presetClass="entr" presetSubtype="0" fill="hold" nodeType="clickEffect">
+                                  <p:stCondLst>
+                                    <p:cond delay="0"/>
+                                  </p:stCondLst>
+                                  <p:childTnLst>
+                                    <p:set>
+                                      <p:cBhvr>
+                                        <p:cTn id="6" dur="1" fill="hold">
+                                          <p:stCondLst>
+                                            <p:cond delay="0"/>
+                                          </p:stCondLst>
+                                        </p:cTn>
+                                        <p:tgtEl>
+                                          <p:spTgt spid="22"/>
+                                        </p:tgtEl>
+                                        <p:attrNameLst>
+                                          <p:attrName>style.visibility</p:attrName>
+                                        </p:attrNameLst>
+                                      </p:cBhvr>
+                                      <p:to>
+                                        <p:strVal val="visible"/>
+                                      </p:to>
+                                    </p:set>
+                                    <p:animEffect transition="in" filter="fade">
+                                      <p:cBhvr>
+                                        <p:cTn id="7" dur="500"/>
+                                        <p:tgtEl>
+                                          <p:spTgt spid="22"/>
+                                        </p:tgtEl>
+                                      </p:cBhvr>
+                                    </p:animEffect>
+                                  </p:childTnLst>
+                                </p:cTn>
+                              </p:par>
+                            </p:childTnLst>
+                          </p:cTn>
+                        </p:par>
+                      </p:childTnLst>
+                    </p:cTn>
+                  </p:par>
+                  <p:par>
+                    <p:cTn id="8" fill="hold">
+                      <p:stCondLst>
+                        <p:cond delay="indefinite"/>
+                      </p:stCondLst>
+                      <p:childTnLst>
+                        <p:par>
+                          <p:cTn id="9" fill="hold">
+                            <p:stCondLst>
+                              <p:cond delay="0"/>
+                            </p:stCondLst>
+                            <p:childTnLst>
+                              <p:par>
+                                <p:cTn id="10" presetID="10" presetClass="entr" presetSubtype="0" fill="hold" nodeType="clickEffect">
+                                  <p:stCondLst>
+                                    <p:cond delay="0"/>
+                                  </p:stCondLst>
+                                  <p:childTnLst>
+                                    <p:set>
+                                      <p:cBhvr>
+                                        <p:cTn id="11" dur="1" fill="hold">
+                                          <p:stCondLst>
+                                            <p:cond delay="0"/>
+                                          </p:stCondLst>
+                                        </p:cTn>
+                                        <p:tgtEl>
+                                          <p:spTgt spid="24">
+                                            <p:txEl>
+                                              <p:pRg st="0" end="0"/>
+                                            </p:txEl>
+                                          </p:spTgt>
+                                        </p:tgtEl>
+                                        <p:attrNameLst>
+                                          <p:attrName>style.visibility</p:attrName>
+                                        </p:attrNameLst>
+                                      </p:cBhvr>
+                                      <p:to>
+                                        <p:strVal val="visible"/>
+                                      </p:to>
+                                    </p:set>
+                                    <p:animEffect transition="in" filter="fade">
+                                      <p:cBhvr>
+                                        <p:cTn id="12" dur="500"/>
+                                        <p:tgtEl>
+                                          <p:spTgt spid="24">
+                                            <p:txEl>
+                                              <p:pRg st="0" end="0"/>
+                                            </p:txEl>
+                                          </p:spTgt>
+                                        </p:tgtEl>
+                                      </p:cBhvr>
+                                    </p:animEffect>
+                                  </p:childTnLst>
+                                </p:cTn>
+                              </p:par>
+                            </p:childTnLst>
+                          </p:cTn>
+                        </p:par>
+                      </p:childTnLst>
+                    </p:cTn>
+                  </p:par>
+                  <p:par>
+                    <p:cTn id="13" fill="hold">
+                      <p:stCondLst>
+                        <p:cond delay="indefinite"/>
+                      </p:stCondLst>
+                      <p:childTnLst>
+                        <p:par>
+                          <p:cTn id="14" fill="hold">
+                            <p:stCondLst>
+                              <p:cond delay="0"/>
+                            </p:stCondLst>
+                            <p:childTnLst>
+                              <p:par>
+                                <p:cTn id="15" presetID="10" presetClass="entr" presetSubtype="0" fill="hold" nodeType="clickEffect">
+                                  <p:stCondLst>
+                                    <p:cond delay="0"/>
+                                  </p:stCondLst>
+                                  <p:childTnLst>
+                                    <p:set>
+                                      <p:cBhvr>
+                                        <p:cTn id="16" dur="1" fill="hold">
+                                          <p:stCondLst>
+                                            <p:cond delay="0"/>
+                                          </p:stCondLst>
+                                        </p:cTn>
+                                        <p:tgtEl>
+                                          <p:spTgt spid="24">
+                                            <p:txEl>
+                                              <p:pRg st="1" end="1"/>
+                                            </p:txEl>
+                                          </p:spTgt>
+                                        </p:tgtEl>
+                                        <p:attrNameLst>
+                                          <p:attrName>style.visibility</p:attrName>
+                                        </p:attrNameLst>
+                                      </p:cBhvr>
+                                      <p:to>
+                                        <p:strVal val="visible"/>
+                                      </p:to>
+                                    </p:set>
+                                    <p:animEffect transition="in" filter="fade">
+                                      <p:cBhvr>
+                                        <p:cTn id="17" dur="500"/>
+                                        <p:tgtEl>
+                                          <p:spTgt spid="24">
+                                            <p:txEl>
+                                              <p:pRg st="1" end="1"/>
+                                            </p:txEl>
+                                          </p:spTgt>
+                                        </p:tgtEl>
+                                      </p:cBhvr>
+                                    </p:animEffect>
+                                  </p:childTnLst>
+                                </p:cTn>
+                              </p:par>
+                              <p:par>
+                                <p:cTn id="18" presetID="10" presetClass="entr" presetSubtype="0" fill="hold" nodeType="withEffect">
+                                  <p:stCondLst>
+                                    <p:cond delay="0"/>
+                                  </p:stCondLst>
+                                  <p:childTnLst>
+                                    <p:set>
+                                      <p:cBhvr>
+                                        <p:cTn id="19" dur="1" fill="hold">
+                                          <p:stCondLst>
+                                            <p:cond delay="0"/>
+                                          </p:stCondLst>
+                                        </p:cTn>
+                                        <p:tgtEl>
+                                          <p:spTgt spid="24">
+                                            <p:txEl>
+                                              <p:pRg st="2" end="2"/>
+                                            </p:txEl>
+                                          </p:spTgt>
+                                        </p:tgtEl>
+                                        <p:attrNameLst>
+                                          <p:attrName>style.visibility</p:attrName>
+                                        </p:attrNameLst>
+                                      </p:cBhvr>
+                                      <p:to>
+                                        <p:strVal val="visible"/>
+                                      </p:to>
+                                    </p:set>
+                                    <p:animEffect transition="in" filter="fade">
+                                      <p:cBhvr>
+                                        <p:cTn id="20" dur="500"/>
+                                        <p:tgtEl>
+                                          <p:spTgt spid="24">
+                                            <p:txEl>
+                                              <p:pRg st="2" end="2"/>
+                                            </p:txEl>
+                                          </p:spTgt>
+                                        </p:tgtEl>
+                                      </p:cBhvr>
+                                    </p:animEffect>
+                                  </p:childTnLst>
+                                </p:cTn>
+                              </p:par>
+                            </p:childTnLst>
+                          </p:cTn>
+                        </p:par>
+                      </p:childTnLst>
+                    </p:cTn>
+                  </p:par>
+                </p:childTnLst>
+              </p:cTn>
+              <p:prevCondLst>
+                <p:cond evt="onPrev" delay="0">
+                  <p:tgtEl>
+                    <p:sldTgt/>
+                  </p:tgtEl>
+                </p:cond>
+              </p:prevCondLst>
+              <p:nextCondLst>
+                <p:cond evt="onNext" delay="0">
+                  <p:tgtEl>
+                    <p:sldTgt/>
+                  </p:tgtEl>
+                </p:cond>
+              </p:nextCondLst>
+            </p:seq>
+          </p:childTnLst>
+        </p:cTn>
+      </p:par>
+    </p:tnLst>
+  </p:timing>
 </p:sld>
 </file>
 
-<file path=ppt/slides/slide4.xml><?xml version="1.0" encoding="utf-8"?>
+<file path=ppt/slides/slide5.xml><?xml version="1.0" encoding="utf-8"?>
 <p:sld xmlns:a="http://schemas.openxmlformats.org/drawingml/2006/main" xmlns:r="http://schemas.openxmlformats.org/officeDocument/2006/relationships" xmlns:p="http://schemas.openxmlformats.org/presentationml/2006/main">
   <p:cSld>
     <p:spTree>
@@ -33052,7 +34415,7 @@
           <p:nvPr/>
         </p:nvPicPr>
         <p:blipFill>
-          <a:blip r:embed="rId2">
+          <a:blip r:embed="rId3">
             <a:extLst>
               <a:ext uri="{28A0092B-C50C-407E-A947-70E740481C1C}">
                 <a14:useLocalDpi xmlns:a14="http://schemas.microsoft.com/office/drawing/2010/main" val="0"/>
@@ -33192,245 +34555,547 @@
   <p:transition>
     <p:fade/>
   </p:transition>
-</p:sld>
-</file>
-
-<file path=ppt/slides/slide5.xml><?xml version="1.0" encoding="utf-8"?>
-<p:sld xmlns:a="http://schemas.openxmlformats.org/drawingml/2006/main" xmlns:r="http://schemas.openxmlformats.org/officeDocument/2006/relationships" xmlns:p="http://schemas.openxmlformats.org/presentationml/2006/main">
-  <p:cSld>
-    <p:spTree>
-      <p:nvGrpSpPr>
-        <p:cNvPr id="1" name=""/>
-        <p:cNvGrpSpPr/>
-        <p:nvPr/>
-      </p:nvGrpSpPr>
-      <p:grpSpPr>
-        <a:xfrm>
-          <a:off x="0" y="0"/>
-          <a:ext cx="0" cy="0"/>
-          <a:chOff x="0" y="0"/>
-          <a:chExt cx="0" cy="0"/>
-        </a:xfrm>
-      </p:grpSpPr>
-      <p:sp>
-        <p:nvSpPr>
-          <p:cNvPr id="4" name="Title 3">
-            <a:extLst>
-              <a:ext uri="{FF2B5EF4-FFF2-40B4-BE49-F238E27FC236}">
-                <a16:creationId xmlns:a16="http://schemas.microsoft.com/office/drawing/2014/main" id="{A867C39A-5EF8-49C2-97FE-67C16C74D0EB}"/>
-              </a:ext>
-            </a:extLst>
-          </p:cNvPr>
-          <p:cNvSpPr>
-            <a:spLocks noGrp="1"/>
-          </p:cNvSpPr>
-          <p:nvPr>
-            <p:ph type="title"/>
-          </p:nvPr>
-        </p:nvSpPr>
-        <p:spPr>
-          <a:xfrm>
-            <a:off x="609600" y="2741120"/>
-            <a:ext cx="10972800" cy="1375761"/>
-          </a:xfrm>
-        </p:spPr>
-        <p:txBody>
-          <a:bodyPr/>
-          <a:lstStyle/>
-          <a:p>
-            <a:r>
-              <a:rPr lang="en-US" dirty="0"/>
-              <a:t>Which Chat Bots </a:t>
-            </a:r>
-            <a:br>
-              <a:rPr lang="en-US" dirty="0"/>
-            </a:br>
-            <a:r>
-              <a:rPr lang="en-US" dirty="0"/>
-              <a:t>have you used in the past?</a:t>
-            </a:r>
-          </a:p>
-        </p:txBody>
-      </p:sp>
-    </p:spTree>
-    <p:extLst>
-      <p:ext uri="{BB962C8B-B14F-4D97-AF65-F5344CB8AC3E}">
-        <p14:creationId xmlns:p14="http://schemas.microsoft.com/office/powerpoint/2010/main" val="3326796776"/>
-      </p:ext>
-    </p:extLst>
-  </p:cSld>
-  <p:clrMapOvr>
-    <a:masterClrMapping/>
-  </p:clrMapOvr>
-  <p:transition>
-    <p:fade/>
-  </p:transition>
+  <p:timing>
+    <p:tnLst>
+      <p:par>
+        <p:cTn id="1" dur="indefinite" restart="never" nodeType="tmRoot">
+          <p:childTnLst>
+            <p:seq concurrent="1" nextAc="seek">
+              <p:cTn id="2" dur="indefinite" nodeType="mainSeq">
+                <p:childTnLst>
+                  <p:par>
+                    <p:cTn id="3" fill="hold">
+                      <p:stCondLst>
+                        <p:cond delay="indefinite"/>
+                      </p:stCondLst>
+                      <p:childTnLst>
+                        <p:par>
+                          <p:cTn id="4" fill="hold">
+                            <p:stCondLst>
+                              <p:cond delay="0"/>
+                            </p:stCondLst>
+                            <p:childTnLst>
+                              <p:par>
+                                <p:cTn id="5" presetID="2" presetClass="entr" presetSubtype="4" fill="hold" nodeType="clickEffect">
+                                  <p:stCondLst>
+                                    <p:cond delay="0"/>
+                                  </p:stCondLst>
+                                  <p:childTnLst>
+                                    <p:set>
+                                      <p:cBhvr>
+                                        <p:cTn id="6" dur="1" fill="hold">
+                                          <p:stCondLst>
+                                            <p:cond delay="0"/>
+                                          </p:stCondLst>
+                                        </p:cTn>
+                                        <p:tgtEl>
+                                          <p:spTgt spid="11"/>
+                                        </p:tgtEl>
+                                        <p:attrNameLst>
+                                          <p:attrName>style.visibility</p:attrName>
+                                        </p:attrNameLst>
+                                      </p:cBhvr>
+                                      <p:to>
+                                        <p:strVal val="visible"/>
+                                      </p:to>
+                                    </p:set>
+                                    <p:anim calcmode="lin" valueType="num">
+                                      <p:cBhvr additive="base">
+                                        <p:cTn id="7" dur="500" fill="hold"/>
+                                        <p:tgtEl>
+                                          <p:spTgt spid="11"/>
+                                        </p:tgtEl>
+                                        <p:attrNameLst>
+                                          <p:attrName>ppt_x</p:attrName>
+                                        </p:attrNameLst>
+                                      </p:cBhvr>
+                                      <p:tavLst>
+                                        <p:tav tm="0">
+                                          <p:val>
+                                            <p:strVal val="#ppt_x"/>
+                                          </p:val>
+                                        </p:tav>
+                                        <p:tav tm="100000">
+                                          <p:val>
+                                            <p:strVal val="#ppt_x"/>
+                                          </p:val>
+                                        </p:tav>
+                                      </p:tavLst>
+                                    </p:anim>
+                                    <p:anim calcmode="lin" valueType="num">
+                                      <p:cBhvr additive="base">
+                                        <p:cTn id="8" dur="500" fill="hold"/>
+                                        <p:tgtEl>
+                                          <p:spTgt spid="11"/>
+                                        </p:tgtEl>
+                                        <p:attrNameLst>
+                                          <p:attrName>ppt_y</p:attrName>
+                                        </p:attrNameLst>
+                                      </p:cBhvr>
+                                      <p:tavLst>
+                                        <p:tav tm="0">
+                                          <p:val>
+                                            <p:strVal val="1+#ppt_h/2"/>
+                                          </p:val>
+                                        </p:tav>
+                                        <p:tav tm="100000">
+                                          <p:val>
+                                            <p:strVal val="#ppt_y"/>
+                                          </p:val>
+                                        </p:tav>
+                                      </p:tavLst>
+                                    </p:anim>
+                                  </p:childTnLst>
+                                </p:cTn>
+                              </p:par>
+                            </p:childTnLst>
+                          </p:cTn>
+                        </p:par>
+                      </p:childTnLst>
+                    </p:cTn>
+                  </p:par>
+                  <p:par>
+                    <p:cTn id="9" fill="hold">
+                      <p:stCondLst>
+                        <p:cond delay="indefinite"/>
+                      </p:stCondLst>
+                      <p:childTnLst>
+                        <p:par>
+                          <p:cTn id="10" fill="hold">
+                            <p:stCondLst>
+                              <p:cond delay="0"/>
+                            </p:stCondLst>
+                            <p:childTnLst>
+                              <p:par>
+                                <p:cTn id="11" presetID="10" presetClass="entr" presetSubtype="0" fill="hold" nodeType="clickEffect">
+                                  <p:stCondLst>
+                                    <p:cond delay="0"/>
+                                  </p:stCondLst>
+                                  <p:childTnLst>
+                                    <p:set>
+                                      <p:cBhvr>
+                                        <p:cTn id="12" dur="1" fill="hold">
+                                          <p:stCondLst>
+                                            <p:cond delay="0"/>
+                                          </p:stCondLst>
+                                        </p:cTn>
+                                        <p:tgtEl>
+                                          <p:spTgt spid="3">
+                                            <p:txEl>
+                                              <p:pRg st="0" end="0"/>
+                                            </p:txEl>
+                                          </p:spTgt>
+                                        </p:tgtEl>
+                                        <p:attrNameLst>
+                                          <p:attrName>style.visibility</p:attrName>
+                                        </p:attrNameLst>
+                                      </p:cBhvr>
+                                      <p:to>
+                                        <p:strVal val="visible"/>
+                                      </p:to>
+                                    </p:set>
+                                    <p:animEffect transition="in" filter="fade">
+                                      <p:cBhvr>
+                                        <p:cTn id="13" dur="500"/>
+                                        <p:tgtEl>
+                                          <p:spTgt spid="3">
+                                            <p:txEl>
+                                              <p:pRg st="0" end="0"/>
+                                            </p:txEl>
+                                          </p:spTgt>
+                                        </p:tgtEl>
+                                      </p:cBhvr>
+                                    </p:animEffect>
+                                  </p:childTnLst>
+                                </p:cTn>
+                              </p:par>
+                            </p:childTnLst>
+                          </p:cTn>
+                        </p:par>
+                      </p:childTnLst>
+                    </p:cTn>
+                  </p:par>
+                  <p:par>
+                    <p:cTn id="14" fill="hold">
+                      <p:stCondLst>
+                        <p:cond delay="indefinite"/>
+                      </p:stCondLst>
+                      <p:childTnLst>
+                        <p:par>
+                          <p:cTn id="15" fill="hold">
+                            <p:stCondLst>
+                              <p:cond delay="0"/>
+                            </p:stCondLst>
+                            <p:childTnLst>
+                              <p:par>
+                                <p:cTn id="16" presetID="10" presetClass="entr" presetSubtype="0" fill="hold" nodeType="clickEffect">
+                                  <p:stCondLst>
+                                    <p:cond delay="0"/>
+                                  </p:stCondLst>
+                                  <p:childTnLst>
+                                    <p:set>
+                                      <p:cBhvr>
+                                        <p:cTn id="17" dur="1" fill="hold">
+                                          <p:stCondLst>
+                                            <p:cond delay="0"/>
+                                          </p:stCondLst>
+                                        </p:cTn>
+                                        <p:tgtEl>
+                                          <p:spTgt spid="3">
+                                            <p:txEl>
+                                              <p:pRg st="1" end="1"/>
+                                            </p:txEl>
+                                          </p:spTgt>
+                                        </p:tgtEl>
+                                        <p:attrNameLst>
+                                          <p:attrName>style.visibility</p:attrName>
+                                        </p:attrNameLst>
+                                      </p:cBhvr>
+                                      <p:to>
+                                        <p:strVal val="visible"/>
+                                      </p:to>
+                                    </p:set>
+                                    <p:animEffect transition="in" filter="fade">
+                                      <p:cBhvr>
+                                        <p:cTn id="18" dur="500"/>
+                                        <p:tgtEl>
+                                          <p:spTgt spid="3">
+                                            <p:txEl>
+                                              <p:pRg st="1" end="1"/>
+                                            </p:txEl>
+                                          </p:spTgt>
+                                        </p:tgtEl>
+                                      </p:cBhvr>
+                                    </p:animEffect>
+                                  </p:childTnLst>
+                                </p:cTn>
+                              </p:par>
+                            </p:childTnLst>
+                          </p:cTn>
+                        </p:par>
+                      </p:childTnLst>
+                    </p:cTn>
+                  </p:par>
+                  <p:par>
+                    <p:cTn id="19" fill="hold">
+                      <p:stCondLst>
+                        <p:cond delay="indefinite"/>
+                      </p:stCondLst>
+                      <p:childTnLst>
+                        <p:par>
+                          <p:cTn id="20" fill="hold">
+                            <p:stCondLst>
+                              <p:cond delay="0"/>
+                            </p:stCondLst>
+                            <p:childTnLst>
+                              <p:par>
+                                <p:cTn id="21" presetID="10" presetClass="entr" presetSubtype="0" fill="hold" nodeType="clickEffect">
+                                  <p:stCondLst>
+                                    <p:cond delay="0"/>
+                                  </p:stCondLst>
+                                  <p:childTnLst>
+                                    <p:set>
+                                      <p:cBhvr>
+                                        <p:cTn id="22" dur="1" fill="hold">
+                                          <p:stCondLst>
+                                            <p:cond delay="0"/>
+                                          </p:stCondLst>
+                                        </p:cTn>
+                                        <p:tgtEl>
+                                          <p:spTgt spid="3">
+                                            <p:txEl>
+                                              <p:pRg st="2" end="2"/>
+                                            </p:txEl>
+                                          </p:spTgt>
+                                        </p:tgtEl>
+                                        <p:attrNameLst>
+                                          <p:attrName>style.visibility</p:attrName>
+                                        </p:attrNameLst>
+                                      </p:cBhvr>
+                                      <p:to>
+                                        <p:strVal val="visible"/>
+                                      </p:to>
+                                    </p:set>
+                                    <p:animEffect transition="in" filter="fade">
+                                      <p:cBhvr>
+                                        <p:cTn id="23" dur="500"/>
+                                        <p:tgtEl>
+                                          <p:spTgt spid="3">
+                                            <p:txEl>
+                                              <p:pRg st="2" end="2"/>
+                                            </p:txEl>
+                                          </p:spTgt>
+                                        </p:tgtEl>
+                                      </p:cBhvr>
+                                    </p:animEffect>
+                                  </p:childTnLst>
+                                </p:cTn>
+                              </p:par>
+                              <p:par>
+                                <p:cTn id="24" presetID="10" presetClass="entr" presetSubtype="0" fill="hold" nodeType="withEffect">
+                                  <p:stCondLst>
+                                    <p:cond delay="0"/>
+                                  </p:stCondLst>
+                                  <p:childTnLst>
+                                    <p:set>
+                                      <p:cBhvr>
+                                        <p:cTn id="25" dur="1" fill="hold">
+                                          <p:stCondLst>
+                                            <p:cond delay="0"/>
+                                          </p:stCondLst>
+                                        </p:cTn>
+                                        <p:tgtEl>
+                                          <p:spTgt spid="3">
+                                            <p:txEl>
+                                              <p:pRg st="3" end="3"/>
+                                            </p:txEl>
+                                          </p:spTgt>
+                                        </p:tgtEl>
+                                        <p:attrNameLst>
+                                          <p:attrName>style.visibility</p:attrName>
+                                        </p:attrNameLst>
+                                      </p:cBhvr>
+                                      <p:to>
+                                        <p:strVal val="visible"/>
+                                      </p:to>
+                                    </p:set>
+                                    <p:animEffect transition="in" filter="fade">
+                                      <p:cBhvr>
+                                        <p:cTn id="26" dur="500"/>
+                                        <p:tgtEl>
+                                          <p:spTgt spid="3">
+                                            <p:txEl>
+                                              <p:pRg st="3" end="3"/>
+                                            </p:txEl>
+                                          </p:spTgt>
+                                        </p:tgtEl>
+                                      </p:cBhvr>
+                                    </p:animEffect>
+                                  </p:childTnLst>
+                                </p:cTn>
+                              </p:par>
+                            </p:childTnLst>
+                          </p:cTn>
+                        </p:par>
+                      </p:childTnLst>
+                    </p:cTn>
+                  </p:par>
+                  <p:par>
+                    <p:cTn id="27" fill="hold">
+                      <p:stCondLst>
+                        <p:cond delay="indefinite"/>
+                      </p:stCondLst>
+                      <p:childTnLst>
+                        <p:par>
+                          <p:cTn id="28" fill="hold">
+                            <p:stCondLst>
+                              <p:cond delay="0"/>
+                            </p:stCondLst>
+                            <p:childTnLst>
+                              <p:par>
+                                <p:cTn id="29" presetID="10" presetClass="entr" presetSubtype="0" fill="hold" nodeType="clickEffect">
+                                  <p:stCondLst>
+                                    <p:cond delay="0"/>
+                                  </p:stCondLst>
+                                  <p:childTnLst>
+                                    <p:set>
+                                      <p:cBhvr>
+                                        <p:cTn id="30" dur="1" fill="hold">
+                                          <p:stCondLst>
+                                            <p:cond delay="0"/>
+                                          </p:stCondLst>
+                                        </p:cTn>
+                                        <p:tgtEl>
+                                          <p:spTgt spid="3">
+                                            <p:txEl>
+                                              <p:pRg st="4" end="4"/>
+                                            </p:txEl>
+                                          </p:spTgt>
+                                        </p:tgtEl>
+                                        <p:attrNameLst>
+                                          <p:attrName>style.visibility</p:attrName>
+                                        </p:attrNameLst>
+                                      </p:cBhvr>
+                                      <p:to>
+                                        <p:strVal val="visible"/>
+                                      </p:to>
+                                    </p:set>
+                                    <p:animEffect transition="in" filter="fade">
+                                      <p:cBhvr>
+                                        <p:cTn id="31" dur="500"/>
+                                        <p:tgtEl>
+                                          <p:spTgt spid="3">
+                                            <p:txEl>
+                                              <p:pRg st="4" end="4"/>
+                                            </p:txEl>
+                                          </p:spTgt>
+                                        </p:tgtEl>
+                                      </p:cBhvr>
+                                    </p:animEffect>
+                                  </p:childTnLst>
+                                </p:cTn>
+                              </p:par>
+                              <p:par>
+                                <p:cTn id="32" presetID="10" presetClass="entr" presetSubtype="0" fill="hold" nodeType="withEffect">
+                                  <p:stCondLst>
+                                    <p:cond delay="0"/>
+                                  </p:stCondLst>
+                                  <p:childTnLst>
+                                    <p:set>
+                                      <p:cBhvr>
+                                        <p:cTn id="33" dur="1" fill="hold">
+                                          <p:stCondLst>
+                                            <p:cond delay="0"/>
+                                          </p:stCondLst>
+                                        </p:cTn>
+                                        <p:tgtEl>
+                                          <p:spTgt spid="3">
+                                            <p:txEl>
+                                              <p:pRg st="5" end="5"/>
+                                            </p:txEl>
+                                          </p:spTgt>
+                                        </p:tgtEl>
+                                        <p:attrNameLst>
+                                          <p:attrName>style.visibility</p:attrName>
+                                        </p:attrNameLst>
+                                      </p:cBhvr>
+                                      <p:to>
+                                        <p:strVal val="visible"/>
+                                      </p:to>
+                                    </p:set>
+                                    <p:animEffect transition="in" filter="fade">
+                                      <p:cBhvr>
+                                        <p:cTn id="34" dur="500"/>
+                                        <p:tgtEl>
+                                          <p:spTgt spid="3">
+                                            <p:txEl>
+                                              <p:pRg st="5" end="5"/>
+                                            </p:txEl>
+                                          </p:spTgt>
+                                        </p:tgtEl>
+                                      </p:cBhvr>
+                                    </p:animEffect>
+                                  </p:childTnLst>
+                                </p:cTn>
+                              </p:par>
+                              <p:par>
+                                <p:cTn id="35" presetID="10" presetClass="entr" presetSubtype="0" fill="hold" nodeType="withEffect">
+                                  <p:stCondLst>
+                                    <p:cond delay="0"/>
+                                  </p:stCondLst>
+                                  <p:childTnLst>
+                                    <p:set>
+                                      <p:cBhvr>
+                                        <p:cTn id="36" dur="1" fill="hold">
+                                          <p:stCondLst>
+                                            <p:cond delay="0"/>
+                                          </p:stCondLst>
+                                        </p:cTn>
+                                        <p:tgtEl>
+                                          <p:spTgt spid="3">
+                                            <p:txEl>
+                                              <p:pRg st="6" end="6"/>
+                                            </p:txEl>
+                                          </p:spTgt>
+                                        </p:tgtEl>
+                                        <p:attrNameLst>
+                                          <p:attrName>style.visibility</p:attrName>
+                                        </p:attrNameLst>
+                                      </p:cBhvr>
+                                      <p:to>
+                                        <p:strVal val="visible"/>
+                                      </p:to>
+                                    </p:set>
+                                    <p:animEffect transition="in" filter="fade">
+                                      <p:cBhvr>
+                                        <p:cTn id="37" dur="500"/>
+                                        <p:tgtEl>
+                                          <p:spTgt spid="3">
+                                            <p:txEl>
+                                              <p:pRg st="6" end="6"/>
+                                            </p:txEl>
+                                          </p:spTgt>
+                                        </p:tgtEl>
+                                      </p:cBhvr>
+                                    </p:animEffect>
+                                  </p:childTnLst>
+                                </p:cTn>
+                              </p:par>
+                              <p:par>
+                                <p:cTn id="38" presetID="10" presetClass="entr" presetSubtype="0" fill="hold" nodeType="withEffect">
+                                  <p:stCondLst>
+                                    <p:cond delay="0"/>
+                                  </p:stCondLst>
+                                  <p:childTnLst>
+                                    <p:set>
+                                      <p:cBhvr>
+                                        <p:cTn id="39" dur="1" fill="hold">
+                                          <p:stCondLst>
+                                            <p:cond delay="0"/>
+                                          </p:stCondLst>
+                                        </p:cTn>
+                                        <p:tgtEl>
+                                          <p:spTgt spid="3">
+                                            <p:txEl>
+                                              <p:pRg st="7" end="7"/>
+                                            </p:txEl>
+                                          </p:spTgt>
+                                        </p:tgtEl>
+                                        <p:attrNameLst>
+                                          <p:attrName>style.visibility</p:attrName>
+                                        </p:attrNameLst>
+                                      </p:cBhvr>
+                                      <p:to>
+                                        <p:strVal val="visible"/>
+                                      </p:to>
+                                    </p:set>
+                                    <p:animEffect transition="in" filter="fade">
+                                      <p:cBhvr>
+                                        <p:cTn id="40" dur="500"/>
+                                        <p:tgtEl>
+                                          <p:spTgt spid="3">
+                                            <p:txEl>
+                                              <p:pRg st="7" end="7"/>
+                                            </p:txEl>
+                                          </p:spTgt>
+                                        </p:tgtEl>
+                                      </p:cBhvr>
+                                    </p:animEffect>
+                                  </p:childTnLst>
+                                </p:cTn>
+                              </p:par>
+                            </p:childTnLst>
+                          </p:cTn>
+                        </p:par>
+                      </p:childTnLst>
+                    </p:cTn>
+                  </p:par>
+                </p:childTnLst>
+              </p:cTn>
+              <p:prevCondLst>
+                <p:cond evt="onPrev" delay="0">
+                  <p:tgtEl>
+                    <p:sldTgt/>
+                  </p:tgtEl>
+                </p:cond>
+              </p:prevCondLst>
+              <p:nextCondLst>
+                <p:cond evt="onNext" delay="0">
+                  <p:tgtEl>
+                    <p:sldTgt/>
+                  </p:tgtEl>
+                </p:cond>
+              </p:nextCondLst>
+            </p:seq>
+          </p:childTnLst>
+        </p:cTn>
+      </p:par>
+    </p:tnLst>
+  </p:timing>
 </p:sld>
 </file>
 
 <file path=ppt/slides/slide6.xml><?xml version="1.0" encoding="utf-8"?>
-<p:sld xmlns:a="http://schemas.openxmlformats.org/drawingml/2006/main" xmlns:r="http://schemas.openxmlformats.org/officeDocument/2006/relationships" xmlns:p="http://schemas.openxmlformats.org/presentationml/2006/main">
-  <p:cSld>
-    <p:spTree>
-      <p:nvGrpSpPr>
-        <p:cNvPr id="1" name=""/>
-        <p:cNvGrpSpPr/>
-        <p:nvPr/>
-      </p:nvGrpSpPr>
-      <p:grpSpPr>
-        <a:xfrm>
-          <a:off x="0" y="0"/>
-          <a:ext cx="0" cy="0"/>
-          <a:chOff x="0" y="0"/>
-          <a:chExt cx="0" cy="0"/>
-        </a:xfrm>
-      </p:grpSpPr>
-      <p:sp>
-        <p:nvSpPr>
-          <p:cNvPr id="3" name="Title 2">
-            <a:extLst>
-              <a:ext uri="{FF2B5EF4-FFF2-40B4-BE49-F238E27FC236}">
-                <a16:creationId xmlns:a16="http://schemas.microsoft.com/office/drawing/2014/main" id="{20438FB0-4434-42D7-B38F-A87CB94A2865}"/>
-              </a:ext>
-            </a:extLst>
-          </p:cNvPr>
-          <p:cNvSpPr>
-            <a:spLocks noGrp="1"/>
-          </p:cNvSpPr>
-          <p:nvPr>
-            <p:ph type="title"/>
-          </p:nvPr>
-        </p:nvSpPr>
-        <p:spPr/>
-        <p:txBody>
-          <a:bodyPr/>
-          <a:lstStyle/>
-          <a:p>
-            <a:r>
-              <a:rPr lang="en-US" dirty="0"/>
-              <a:t>Hy-Tech Club Chat Bot Sandbox Discord Server</a:t>
-            </a:r>
-          </a:p>
-        </p:txBody>
-      </p:sp>
-      <p:sp>
-        <p:nvSpPr>
-          <p:cNvPr id="4" name="Content Placeholder 3">
-            <a:extLst>
-              <a:ext uri="{FF2B5EF4-FFF2-40B4-BE49-F238E27FC236}">
-                <a16:creationId xmlns:a16="http://schemas.microsoft.com/office/drawing/2014/main" id="{E3C46A73-E364-49A9-A448-7322D297415C}"/>
-              </a:ext>
-            </a:extLst>
-          </p:cNvPr>
-          <p:cNvSpPr>
-            <a:spLocks noGrp="1"/>
-          </p:cNvSpPr>
-          <p:nvPr>
-            <p:ph idx="1"/>
-          </p:nvPr>
-        </p:nvSpPr>
-        <p:spPr>
-          <a:xfrm>
-            <a:off x="381000" y="4191000"/>
-            <a:ext cx="11430000" cy="2209800"/>
-          </a:xfrm>
-        </p:spPr>
-        <p:txBody>
-          <a:bodyPr/>
-          <a:lstStyle/>
-          <a:p>
-            <a:r>
-              <a:rPr lang="en-US" dirty="0"/>
-              <a:t>Join the Hy-Tech Club Chat Bot Sandbox!</a:t>
-            </a:r>
-          </a:p>
-          <a:p>
-            <a:r>
-              <a:rPr lang="en-US" dirty="0"/>
-              <a:t>This Discord server will allow you to test your chat bots!</a:t>
-            </a:r>
-          </a:p>
-          <a:p>
-            <a:r>
-              <a:rPr lang="en-US" b="0" i="0" dirty="0">
-                <a:solidFill>
-                  <a:srgbClr val="24292E"/>
-                </a:solidFill>
-                <a:effectLst/>
-                <a:latin typeface="SFMono-Regular"/>
-                <a:hlinkClick r:id="rId2"/>
-              </a:rPr>
-              <a:t>https://discord.gg/7VUAKkHEvm</a:t>
-            </a:r>
-            <a:endParaRPr lang="en-US" b="0" i="0" dirty="0">
-              <a:solidFill>
-                <a:srgbClr val="24292E"/>
-              </a:solidFill>
-              <a:effectLst/>
-              <a:latin typeface="SFMono-Regular"/>
-            </a:endParaRPr>
-          </a:p>
-          <a:p>
-            <a:pPr marL="57150" indent="0">
-              <a:buNone/>
-            </a:pPr>
-            <a:endParaRPr lang="en-US" dirty="0"/>
-          </a:p>
-        </p:txBody>
-      </p:sp>
-      <p:pic>
-        <p:nvPicPr>
-          <p:cNvPr id="6" name="Picture 5" descr="Icon&#10;&#10;Description automatically generated">
-            <a:extLst>
-              <a:ext uri="{FF2B5EF4-FFF2-40B4-BE49-F238E27FC236}">
-                <a16:creationId xmlns:a16="http://schemas.microsoft.com/office/drawing/2014/main" id="{B7644E0F-9334-4A88-A7D3-69D3EA16B1AE}"/>
-              </a:ext>
-            </a:extLst>
-          </p:cNvPr>
-          <p:cNvPicPr>
-            <a:picLocks noChangeAspect="1"/>
-          </p:cNvPicPr>
-          <p:nvPr/>
-        </p:nvPicPr>
-        <p:blipFill>
-          <a:blip r:embed="rId3">
-            <a:extLst>
-              <a:ext uri="{28A0092B-C50C-407E-A947-70E740481C1C}">
-                <a14:useLocalDpi xmlns:a14="http://schemas.microsoft.com/office/drawing/2010/main" val="0"/>
-              </a:ext>
-            </a:extLst>
-          </a:blip>
-          <a:stretch>
-            <a:fillRect/>
-          </a:stretch>
-        </p:blipFill>
-        <p:spPr>
-          <a:xfrm>
-            <a:off x="4495800" y="1432249"/>
-            <a:ext cx="2240902" cy="2240902"/>
-          </a:xfrm>
-          <a:prstGeom prst="rect">
-            <a:avLst/>
-          </a:prstGeom>
-        </p:spPr>
-      </p:pic>
-    </p:spTree>
-    <p:extLst>
-      <p:ext uri="{BB962C8B-B14F-4D97-AF65-F5344CB8AC3E}">
-        <p14:creationId xmlns:p14="http://schemas.microsoft.com/office/powerpoint/2010/main" val="1555033429"/>
-      </p:ext>
-    </p:extLst>
-  </p:cSld>
-  <p:clrMapOvr>
-    <a:masterClrMapping/>
-  </p:clrMapOvr>
-  <p:transition>
-    <p:fade/>
-  </p:transition>
-</p:sld>
-</file>
-
-<file path=ppt/slides/slide7.xml><?xml version="1.0" encoding="utf-8"?>
 <p:sld xmlns:a="http://schemas.openxmlformats.org/drawingml/2006/main" xmlns:r="http://schemas.openxmlformats.org/officeDocument/2006/relationships" xmlns:p="http://schemas.openxmlformats.org/presentationml/2006/main">
   <p:cSld>
     <p:spTree>

</xml_diff>